<commit_message>
bid page is working, except for submit (form.save())
</commit_message>
<xml_diff>
--- a/presentation.pptx
+++ b/presentation.pptx
@@ -19,14 +19,15 @@
     <p:sldId id="260" r:id="rId13"/>
     <p:sldId id="269" r:id="rId14"/>
     <p:sldId id="262" r:id="rId15"/>
-    <p:sldId id="264" r:id="rId16"/>
-    <p:sldId id="266" r:id="rId17"/>
-    <p:sldId id="277" r:id="rId18"/>
-    <p:sldId id="279" r:id="rId19"/>
-    <p:sldId id="268" r:id="rId20"/>
-    <p:sldId id="274" r:id="rId21"/>
-    <p:sldId id="280" r:id="rId22"/>
-    <p:sldId id="267" r:id="rId23"/>
+    <p:sldId id="281" r:id="rId16"/>
+    <p:sldId id="264" r:id="rId17"/>
+    <p:sldId id="266" r:id="rId18"/>
+    <p:sldId id="277" r:id="rId19"/>
+    <p:sldId id="279" r:id="rId20"/>
+    <p:sldId id="268" r:id="rId21"/>
+    <p:sldId id="274" r:id="rId22"/>
+    <p:sldId id="280" r:id="rId23"/>
+    <p:sldId id="267" r:id="rId24"/>
   </p:sldIdLst>
   <p:sldSz cx="12192000" cy="6858000"/>
   <p:notesSz cx="6858000" cy="9144000"/>
@@ -280,7 +281,7 @@
           <a:p>
             <a:fld id="{90B9546A-7969-4B1B-92AE-0EBC43C27576}" type="datetimeFigureOut">
               <a:rPr lang="en-US" smtClean="0"/>
-              <a:t>3/15/2020</a:t>
+              <a:t>4/3/2020</a:t>
             </a:fld>
             <a:endParaRPr lang="en-US"/>
           </a:p>
@@ -478,7 +479,7 @@
           <a:p>
             <a:fld id="{90B9546A-7969-4B1B-92AE-0EBC43C27576}" type="datetimeFigureOut">
               <a:rPr lang="en-US" smtClean="0"/>
-              <a:t>3/15/2020</a:t>
+              <a:t>4/3/2020</a:t>
             </a:fld>
             <a:endParaRPr lang="en-US"/>
           </a:p>
@@ -686,7 +687,7 @@
           <a:p>
             <a:fld id="{90B9546A-7969-4B1B-92AE-0EBC43C27576}" type="datetimeFigureOut">
               <a:rPr lang="en-US" smtClean="0"/>
-              <a:t>3/15/2020</a:t>
+              <a:t>4/3/2020</a:t>
             </a:fld>
             <a:endParaRPr lang="en-US"/>
           </a:p>
@@ -884,7 +885,7 @@
           <a:p>
             <a:fld id="{90B9546A-7969-4B1B-92AE-0EBC43C27576}" type="datetimeFigureOut">
               <a:rPr lang="en-US" smtClean="0"/>
-              <a:t>3/15/2020</a:t>
+              <a:t>4/3/2020</a:t>
             </a:fld>
             <a:endParaRPr lang="en-US"/>
           </a:p>
@@ -1159,7 +1160,7 @@
           <a:p>
             <a:fld id="{90B9546A-7969-4B1B-92AE-0EBC43C27576}" type="datetimeFigureOut">
               <a:rPr lang="en-US" smtClean="0"/>
-              <a:t>3/15/2020</a:t>
+              <a:t>4/3/2020</a:t>
             </a:fld>
             <a:endParaRPr lang="en-US"/>
           </a:p>
@@ -1424,7 +1425,7 @@
           <a:p>
             <a:fld id="{90B9546A-7969-4B1B-92AE-0EBC43C27576}" type="datetimeFigureOut">
               <a:rPr lang="en-US" smtClean="0"/>
-              <a:t>3/15/2020</a:t>
+              <a:t>4/3/2020</a:t>
             </a:fld>
             <a:endParaRPr lang="en-US"/>
           </a:p>
@@ -1836,7 +1837,7 @@
           <a:p>
             <a:fld id="{90B9546A-7969-4B1B-92AE-0EBC43C27576}" type="datetimeFigureOut">
               <a:rPr lang="en-US" smtClean="0"/>
-              <a:t>3/15/2020</a:t>
+              <a:t>4/3/2020</a:t>
             </a:fld>
             <a:endParaRPr lang="en-US"/>
           </a:p>
@@ -1977,7 +1978,7 @@
           <a:p>
             <a:fld id="{90B9546A-7969-4B1B-92AE-0EBC43C27576}" type="datetimeFigureOut">
               <a:rPr lang="en-US" smtClean="0"/>
-              <a:t>3/15/2020</a:t>
+              <a:t>4/3/2020</a:t>
             </a:fld>
             <a:endParaRPr lang="en-US"/>
           </a:p>
@@ -2090,7 +2091,7 @@
           <a:p>
             <a:fld id="{90B9546A-7969-4B1B-92AE-0EBC43C27576}" type="datetimeFigureOut">
               <a:rPr lang="en-US" smtClean="0"/>
-              <a:t>3/15/2020</a:t>
+              <a:t>4/3/2020</a:t>
             </a:fld>
             <a:endParaRPr lang="en-US"/>
           </a:p>
@@ -2401,7 +2402,7 @@
           <a:p>
             <a:fld id="{90B9546A-7969-4B1B-92AE-0EBC43C27576}" type="datetimeFigureOut">
               <a:rPr lang="en-US" smtClean="0"/>
-              <a:t>3/15/2020</a:t>
+              <a:t>4/3/2020</a:t>
             </a:fld>
             <a:endParaRPr lang="en-US"/>
           </a:p>
@@ -2689,7 +2690,7 @@
           <a:p>
             <a:fld id="{90B9546A-7969-4B1B-92AE-0EBC43C27576}" type="datetimeFigureOut">
               <a:rPr lang="en-US" smtClean="0"/>
-              <a:t>3/15/2020</a:t>
+              <a:t>4/3/2020</a:t>
             </a:fld>
             <a:endParaRPr lang="en-US"/>
           </a:p>
@@ -2930,7 +2931,7 @@
           <a:p>
             <a:fld id="{90B9546A-7969-4B1B-92AE-0EBC43C27576}" type="datetimeFigureOut">
               <a:rPr lang="en-US" smtClean="0"/>
-              <a:t>3/15/2020</a:t>
+              <a:t>4/3/2020</a:t>
             </a:fld>
             <a:endParaRPr lang="en-US"/>
           </a:p>
@@ -4735,7 +4736,7 @@
           <p:cNvPr id="2" name="Title 1">
             <a:extLst>
               <a:ext uri="{FF2B5EF4-FFF2-40B4-BE49-F238E27FC236}">
-                <a16:creationId xmlns:a16="http://schemas.microsoft.com/office/drawing/2014/main" id="{6DE6F54D-E928-44DE-963C-D655747854A9}"/>
+                <a16:creationId xmlns:a16="http://schemas.microsoft.com/office/drawing/2014/main" id="{AD43C4F4-25BA-45ED-B641-FA001051DEFE}"/>
               </a:ext>
             </a:extLst>
           </p:cNvPr>
@@ -4753,785 +4754,162 @@
           <a:p>
             <a:r>
               <a:rPr lang="en-US" dirty="0"/>
-              <a:t>Proposed Site Map</a:t>
-            </a:r>
-          </a:p>
-        </p:txBody>
-      </p:sp>
-      <p:sp>
-        <p:nvSpPr>
-          <p:cNvPr id="4" name="TextBox 3">
-            <a:extLst>
-              <a:ext uri="{FF2B5EF4-FFF2-40B4-BE49-F238E27FC236}">
-                <a16:creationId xmlns:a16="http://schemas.microsoft.com/office/drawing/2014/main" id="{B40D84BE-C8F7-4B2B-881E-88214C9646CD}"/>
-              </a:ext>
-            </a:extLst>
-          </p:cNvPr>
-          <p:cNvSpPr txBox="1"/>
-          <p:nvPr/>
-        </p:nvSpPr>
-        <p:spPr>
-          <a:xfrm>
-            <a:off x="5949893" y="3476799"/>
-            <a:ext cx="1911291" cy="369332"/>
-          </a:xfrm>
-          <a:prstGeom prst="rect">
-            <a:avLst/>
-          </a:prstGeom>
-          <a:noFill/>
-          <a:ln>
-            <a:solidFill>
-              <a:schemeClr val="tx1"/>
-            </a:solidFill>
-          </a:ln>
-        </p:spPr>
-        <p:txBody>
-          <a:bodyPr wrap="square" rtlCol="0">
-            <a:spAutoFit/>
+              <a:t>Priority Content</a:t>
+            </a:r>
+          </a:p>
+        </p:txBody>
+      </p:sp>
+      <p:sp>
+        <p:nvSpPr>
+          <p:cNvPr id="3" name="Content Placeholder 2">
+            <a:extLst>
+              <a:ext uri="{FF2B5EF4-FFF2-40B4-BE49-F238E27FC236}">
+                <a16:creationId xmlns:a16="http://schemas.microsoft.com/office/drawing/2014/main" id="{09ACA401-E991-49E0-8D2D-67AE4993E0DE}"/>
+              </a:ext>
+            </a:extLst>
+          </p:cNvPr>
+          <p:cNvSpPr>
+            <a:spLocks noGrp="1"/>
+          </p:cNvSpPr>
+          <p:nvPr>
+            <p:ph idx="1"/>
+          </p:nvPr>
+        </p:nvSpPr>
+        <p:spPr/>
+        <p:txBody>
+          <a:bodyPr>
+            <a:normAutofit fontScale="92500" lnSpcReduction="10000"/>
           </a:bodyPr>
           <a:lstStyle/>
           <a:p>
-            <a:pPr algn="ctr"/>
-            <a:r>
-              <a:rPr lang="en-US" dirty="0"/>
-              <a:t>Leaderboard</a:t>
-            </a:r>
-          </a:p>
-        </p:txBody>
-      </p:sp>
-      <p:sp>
-        <p:nvSpPr>
-          <p:cNvPr id="5" name="TextBox 4">
-            <a:extLst>
-              <a:ext uri="{FF2B5EF4-FFF2-40B4-BE49-F238E27FC236}">
-                <a16:creationId xmlns:a16="http://schemas.microsoft.com/office/drawing/2014/main" id="{43881D1D-F294-4E47-8457-E91C07EB98A8}"/>
-              </a:ext>
-            </a:extLst>
-          </p:cNvPr>
-          <p:cNvSpPr txBox="1"/>
-          <p:nvPr/>
-        </p:nvSpPr>
-        <p:spPr>
-          <a:xfrm>
-            <a:off x="5217952" y="1690688"/>
-            <a:ext cx="1459684" cy="369332"/>
-          </a:xfrm>
-          <a:prstGeom prst="rect">
-            <a:avLst/>
-          </a:prstGeom>
-          <a:noFill/>
-          <a:ln>
-            <a:solidFill>
-              <a:schemeClr val="tx1"/>
-            </a:solidFill>
-          </a:ln>
-        </p:spPr>
-        <p:txBody>
-          <a:bodyPr wrap="square" rtlCol="0">
-            <a:spAutoFit/>
-          </a:bodyPr>
-          <a:lstStyle/>
-          <a:p>
-            <a:pPr algn="ctr"/>
-            <a:r>
-              <a:rPr lang="en-US" dirty="0"/>
-              <a:t>Login</a:t>
-            </a:r>
-          </a:p>
-        </p:txBody>
-      </p:sp>
-      <p:sp>
-        <p:nvSpPr>
-          <p:cNvPr id="7" name="TextBox 6">
-            <a:extLst>
-              <a:ext uri="{FF2B5EF4-FFF2-40B4-BE49-F238E27FC236}">
-                <a16:creationId xmlns:a16="http://schemas.microsoft.com/office/drawing/2014/main" id="{E2C353D0-78CA-42F0-98BB-384525491763}"/>
-              </a:ext>
-            </a:extLst>
-          </p:cNvPr>
-          <p:cNvSpPr txBox="1"/>
-          <p:nvPr/>
-        </p:nvSpPr>
-        <p:spPr>
-          <a:xfrm>
-            <a:off x="6175697" y="4379455"/>
-            <a:ext cx="1459684" cy="369332"/>
-          </a:xfrm>
-          <a:prstGeom prst="rect">
-            <a:avLst/>
-          </a:prstGeom>
-          <a:noFill/>
-          <a:ln>
-            <a:solidFill>
-              <a:schemeClr val="tx1"/>
-            </a:solidFill>
-          </a:ln>
-        </p:spPr>
-        <p:txBody>
-          <a:bodyPr wrap="square" rtlCol="0">
-            <a:spAutoFit/>
-          </a:bodyPr>
-          <a:lstStyle/>
-          <a:p>
-            <a:pPr algn="ctr"/>
-            <a:r>
-              <a:rPr lang="en-US" dirty="0"/>
-              <a:t>Choose a Star</a:t>
-            </a:r>
-          </a:p>
-        </p:txBody>
-      </p:sp>
-      <p:sp>
-        <p:nvSpPr>
-          <p:cNvPr id="8" name="TextBox 7">
-            <a:extLst>
-              <a:ext uri="{FF2B5EF4-FFF2-40B4-BE49-F238E27FC236}">
-                <a16:creationId xmlns:a16="http://schemas.microsoft.com/office/drawing/2014/main" id="{4E26735B-D9F6-4DD4-B3BF-A0A56E156A22}"/>
-              </a:ext>
-            </a:extLst>
-          </p:cNvPr>
-          <p:cNvSpPr txBox="1"/>
-          <p:nvPr/>
-        </p:nvSpPr>
-        <p:spPr>
-          <a:xfrm>
-            <a:off x="5947794" y="5097445"/>
-            <a:ext cx="1911291" cy="369332"/>
-          </a:xfrm>
-          <a:prstGeom prst="rect">
-            <a:avLst/>
-          </a:prstGeom>
-          <a:noFill/>
-          <a:ln>
-            <a:solidFill>
-              <a:schemeClr val="tx1"/>
-            </a:solidFill>
-          </a:ln>
-        </p:spPr>
-        <p:txBody>
-          <a:bodyPr wrap="square" rtlCol="0">
-            <a:spAutoFit/>
-          </a:bodyPr>
-          <a:lstStyle/>
-          <a:p>
-            <a:pPr algn="ctr"/>
-            <a:r>
-              <a:rPr lang="en-US" dirty="0"/>
-              <a:t>Analyze / Classify</a:t>
-            </a:r>
-          </a:p>
-        </p:txBody>
-      </p:sp>
-      <p:sp>
-        <p:nvSpPr>
-          <p:cNvPr id="9" name="TextBox 8">
-            <a:extLst>
-              <a:ext uri="{FF2B5EF4-FFF2-40B4-BE49-F238E27FC236}">
-                <a16:creationId xmlns:a16="http://schemas.microsoft.com/office/drawing/2014/main" id="{2A83839C-3730-4E9F-AF9C-E5D31978CD8A}"/>
-              </a:ext>
-            </a:extLst>
-          </p:cNvPr>
-          <p:cNvSpPr txBox="1"/>
-          <p:nvPr/>
-        </p:nvSpPr>
-        <p:spPr>
-          <a:xfrm>
-            <a:off x="2467240" y="2733883"/>
-            <a:ext cx="1459684" cy="369332"/>
-          </a:xfrm>
-          <a:prstGeom prst="rect">
-            <a:avLst/>
-          </a:prstGeom>
-          <a:noFill/>
-          <a:ln>
-            <a:solidFill>
-              <a:schemeClr val="tx1"/>
-            </a:solidFill>
-          </a:ln>
-        </p:spPr>
-        <p:txBody>
-          <a:bodyPr wrap="square" rtlCol="0">
-            <a:spAutoFit/>
-          </a:bodyPr>
-          <a:lstStyle/>
-          <a:p>
-            <a:pPr algn="ctr"/>
-            <a:r>
-              <a:rPr lang="en-US" dirty="0"/>
-              <a:t>Admin</a:t>
-            </a:r>
-          </a:p>
-        </p:txBody>
-      </p:sp>
-      <p:sp>
-        <p:nvSpPr>
-          <p:cNvPr id="10" name="TextBox 9">
-            <a:extLst>
-              <a:ext uri="{FF2B5EF4-FFF2-40B4-BE49-F238E27FC236}">
-                <a16:creationId xmlns:a16="http://schemas.microsoft.com/office/drawing/2014/main" id="{BFA04579-982B-4096-90E8-F8D4106059AF}"/>
-              </a:ext>
-            </a:extLst>
-          </p:cNvPr>
-          <p:cNvSpPr txBox="1"/>
-          <p:nvPr/>
-        </p:nvSpPr>
-        <p:spPr>
-          <a:xfrm>
-            <a:off x="957222" y="3684918"/>
-            <a:ext cx="1979802" cy="369332"/>
-          </a:xfrm>
-          <a:prstGeom prst="rect">
-            <a:avLst/>
-          </a:prstGeom>
-          <a:noFill/>
-          <a:ln>
-            <a:solidFill>
-              <a:schemeClr val="tx1"/>
-            </a:solidFill>
-          </a:ln>
-        </p:spPr>
-        <p:txBody>
-          <a:bodyPr wrap="square" rtlCol="0">
-            <a:spAutoFit/>
-          </a:bodyPr>
-          <a:lstStyle/>
-          <a:p>
-            <a:pPr algn="ctr"/>
-            <a:r>
-              <a:rPr lang="en-US" dirty="0"/>
-              <a:t>Users/Groups</a:t>
-            </a:r>
-          </a:p>
-        </p:txBody>
-      </p:sp>
-      <p:sp>
-        <p:nvSpPr>
-          <p:cNvPr id="11" name="TextBox 10">
-            <a:extLst>
-              <a:ext uri="{FF2B5EF4-FFF2-40B4-BE49-F238E27FC236}">
-                <a16:creationId xmlns:a16="http://schemas.microsoft.com/office/drawing/2014/main" id="{53644665-8842-40DA-B829-57D70D02E186}"/>
-              </a:ext>
-            </a:extLst>
-          </p:cNvPr>
-          <p:cNvSpPr txBox="1"/>
-          <p:nvPr/>
-        </p:nvSpPr>
-        <p:spPr>
-          <a:xfrm>
-            <a:off x="3287962" y="3684918"/>
-            <a:ext cx="1979802" cy="369332"/>
-          </a:xfrm>
-          <a:prstGeom prst="rect">
-            <a:avLst/>
-          </a:prstGeom>
-          <a:noFill/>
-          <a:ln>
-            <a:solidFill>
-              <a:schemeClr val="tx1"/>
-            </a:solidFill>
-          </a:ln>
-        </p:spPr>
-        <p:txBody>
-          <a:bodyPr wrap="square" rtlCol="0">
-            <a:spAutoFit/>
-          </a:bodyPr>
-          <a:lstStyle/>
-          <a:p>
-            <a:pPr algn="ctr"/>
-            <a:r>
-              <a:rPr lang="en-US" dirty="0"/>
-              <a:t>Database</a:t>
-            </a:r>
-          </a:p>
-        </p:txBody>
-      </p:sp>
-      <p:cxnSp>
-        <p:nvCxnSpPr>
-          <p:cNvPr id="13" name="Straight Connector 12">
-            <a:extLst>
-              <a:ext uri="{FF2B5EF4-FFF2-40B4-BE49-F238E27FC236}">
-                <a16:creationId xmlns:a16="http://schemas.microsoft.com/office/drawing/2014/main" id="{2049117A-3189-4D6C-B59E-EFF184DED37B}"/>
-              </a:ext>
-            </a:extLst>
-          </p:cNvPr>
-          <p:cNvCxnSpPr>
-            <a:cxnSpLocks/>
-            <a:stCxn id="5" idx="2"/>
-            <a:endCxn id="41" idx="0"/>
-          </p:cNvCxnSpPr>
-          <p:nvPr/>
-        </p:nvCxnSpPr>
-        <p:spPr>
-          <a:xfrm>
-            <a:off x="5947794" y="2060020"/>
-            <a:ext cx="2866937" cy="616638"/>
-          </a:xfrm>
-          <a:prstGeom prst="line">
-            <a:avLst/>
-          </a:prstGeom>
-        </p:spPr>
-        <p:style>
-          <a:lnRef idx="1">
-            <a:schemeClr val="accent1"/>
-          </a:lnRef>
-          <a:fillRef idx="0">
-            <a:schemeClr val="accent1"/>
-          </a:fillRef>
-          <a:effectRef idx="0">
-            <a:schemeClr val="accent1"/>
-          </a:effectRef>
-          <a:fontRef idx="minor">
-            <a:schemeClr val="tx1"/>
-          </a:fontRef>
-        </p:style>
-      </p:cxnSp>
-      <p:cxnSp>
-        <p:nvCxnSpPr>
-          <p:cNvPr id="15" name="Straight Connector 14">
-            <a:extLst>
-              <a:ext uri="{FF2B5EF4-FFF2-40B4-BE49-F238E27FC236}">
-                <a16:creationId xmlns:a16="http://schemas.microsoft.com/office/drawing/2014/main" id="{0F9A1D4A-7D89-41AD-B5E0-4F8E91EE2AC4}"/>
-              </a:ext>
-            </a:extLst>
-          </p:cNvPr>
-          <p:cNvCxnSpPr>
-            <a:cxnSpLocks/>
-            <a:stCxn id="7" idx="0"/>
-            <a:endCxn id="4" idx="2"/>
-          </p:cNvCxnSpPr>
-          <p:nvPr/>
-        </p:nvCxnSpPr>
-        <p:spPr>
-          <a:xfrm flipV="1">
-            <a:off x="6905539" y="3846131"/>
-            <a:ext cx="0" cy="533324"/>
-          </a:xfrm>
-          <a:prstGeom prst="line">
-            <a:avLst/>
-          </a:prstGeom>
-        </p:spPr>
-        <p:style>
-          <a:lnRef idx="1">
-            <a:schemeClr val="accent1"/>
-          </a:lnRef>
-          <a:fillRef idx="0">
-            <a:schemeClr val="accent1"/>
-          </a:fillRef>
-          <a:effectRef idx="0">
-            <a:schemeClr val="accent1"/>
-          </a:effectRef>
-          <a:fontRef idx="minor">
-            <a:schemeClr val="tx1"/>
-          </a:fontRef>
-        </p:style>
-      </p:cxnSp>
-      <p:cxnSp>
-        <p:nvCxnSpPr>
-          <p:cNvPr id="18" name="Straight Connector 17">
-            <a:extLst>
-              <a:ext uri="{FF2B5EF4-FFF2-40B4-BE49-F238E27FC236}">
-                <a16:creationId xmlns:a16="http://schemas.microsoft.com/office/drawing/2014/main" id="{431CE483-D9FB-47EE-8916-2D56E6117021}"/>
-              </a:ext>
-            </a:extLst>
-          </p:cNvPr>
-          <p:cNvCxnSpPr>
-            <a:cxnSpLocks/>
-            <a:stCxn id="8" idx="0"/>
-            <a:endCxn id="7" idx="2"/>
-          </p:cNvCxnSpPr>
-          <p:nvPr/>
-        </p:nvCxnSpPr>
-        <p:spPr>
-          <a:xfrm flipV="1">
-            <a:off x="6903440" y="4748787"/>
-            <a:ext cx="2099" cy="348658"/>
-          </a:xfrm>
-          <a:prstGeom prst="line">
-            <a:avLst/>
-          </a:prstGeom>
-        </p:spPr>
-        <p:style>
-          <a:lnRef idx="1">
-            <a:schemeClr val="accent1"/>
-          </a:lnRef>
-          <a:fillRef idx="0">
-            <a:schemeClr val="accent1"/>
-          </a:fillRef>
-          <a:effectRef idx="0">
-            <a:schemeClr val="accent1"/>
-          </a:effectRef>
-          <a:fontRef idx="minor">
-            <a:schemeClr val="tx1"/>
-          </a:fontRef>
-        </p:style>
-      </p:cxnSp>
-      <p:cxnSp>
-        <p:nvCxnSpPr>
-          <p:cNvPr id="21" name="Straight Connector 20">
-            <a:extLst>
-              <a:ext uri="{FF2B5EF4-FFF2-40B4-BE49-F238E27FC236}">
-                <a16:creationId xmlns:a16="http://schemas.microsoft.com/office/drawing/2014/main" id="{10B4C6B9-8144-4788-B7CE-0AB403499508}"/>
-              </a:ext>
-            </a:extLst>
-          </p:cNvPr>
-          <p:cNvCxnSpPr>
-            <a:cxnSpLocks/>
-            <a:stCxn id="9" idx="0"/>
-            <a:endCxn id="5" idx="2"/>
-          </p:cNvCxnSpPr>
-          <p:nvPr/>
-        </p:nvCxnSpPr>
-        <p:spPr>
-          <a:xfrm flipV="1">
-            <a:off x="3197082" y="2060020"/>
-            <a:ext cx="2750712" cy="673863"/>
-          </a:xfrm>
-          <a:prstGeom prst="line">
-            <a:avLst/>
-          </a:prstGeom>
-        </p:spPr>
-        <p:style>
-          <a:lnRef idx="1">
-            <a:schemeClr val="accent1"/>
-          </a:lnRef>
-          <a:fillRef idx="0">
-            <a:schemeClr val="accent1"/>
-          </a:fillRef>
-          <a:effectRef idx="0">
-            <a:schemeClr val="accent1"/>
-          </a:effectRef>
-          <a:fontRef idx="minor">
-            <a:schemeClr val="tx1"/>
-          </a:fontRef>
-        </p:style>
-      </p:cxnSp>
-      <p:cxnSp>
-        <p:nvCxnSpPr>
-          <p:cNvPr id="24" name="Straight Connector 23">
-            <a:extLst>
-              <a:ext uri="{FF2B5EF4-FFF2-40B4-BE49-F238E27FC236}">
-                <a16:creationId xmlns:a16="http://schemas.microsoft.com/office/drawing/2014/main" id="{C064B7BD-9E88-47C3-B054-895D5D289738}"/>
-              </a:ext>
-            </a:extLst>
-          </p:cNvPr>
-          <p:cNvCxnSpPr>
-            <a:cxnSpLocks/>
-            <a:stCxn id="11" idx="0"/>
-            <a:endCxn id="9" idx="2"/>
-          </p:cNvCxnSpPr>
-          <p:nvPr/>
-        </p:nvCxnSpPr>
-        <p:spPr>
-          <a:xfrm flipH="1" flipV="1">
-            <a:off x="3197082" y="3103215"/>
-            <a:ext cx="1080781" cy="581703"/>
-          </a:xfrm>
-          <a:prstGeom prst="line">
-            <a:avLst/>
-          </a:prstGeom>
-        </p:spPr>
-        <p:style>
-          <a:lnRef idx="1">
-            <a:schemeClr val="accent1"/>
-          </a:lnRef>
-          <a:fillRef idx="0">
-            <a:schemeClr val="accent1"/>
-          </a:fillRef>
-          <a:effectRef idx="0">
-            <a:schemeClr val="accent1"/>
-          </a:effectRef>
-          <a:fontRef idx="minor">
-            <a:schemeClr val="tx1"/>
-          </a:fontRef>
-        </p:style>
-      </p:cxnSp>
-      <p:cxnSp>
-        <p:nvCxnSpPr>
-          <p:cNvPr id="27" name="Straight Connector 26">
-            <a:extLst>
-              <a:ext uri="{FF2B5EF4-FFF2-40B4-BE49-F238E27FC236}">
-                <a16:creationId xmlns:a16="http://schemas.microsoft.com/office/drawing/2014/main" id="{28D6298D-BF4E-4AB1-A666-335A8DC783F0}"/>
-              </a:ext>
-            </a:extLst>
-          </p:cNvPr>
-          <p:cNvCxnSpPr>
-            <a:cxnSpLocks/>
-            <a:stCxn id="10" idx="0"/>
-            <a:endCxn id="9" idx="2"/>
-          </p:cNvCxnSpPr>
-          <p:nvPr/>
-        </p:nvCxnSpPr>
-        <p:spPr>
-          <a:xfrm flipV="1">
-            <a:off x="1947123" y="3103215"/>
-            <a:ext cx="1249959" cy="581703"/>
-          </a:xfrm>
-          <a:prstGeom prst="line">
-            <a:avLst/>
-          </a:prstGeom>
-        </p:spPr>
-        <p:style>
-          <a:lnRef idx="1">
-            <a:schemeClr val="accent1"/>
-          </a:lnRef>
-          <a:fillRef idx="0">
-            <a:schemeClr val="accent1"/>
-          </a:fillRef>
-          <a:effectRef idx="0">
-            <a:schemeClr val="accent1"/>
-          </a:effectRef>
-          <a:fontRef idx="minor">
-            <a:schemeClr val="tx1"/>
-          </a:fontRef>
-        </p:style>
-      </p:cxnSp>
-      <p:sp>
-        <p:nvSpPr>
-          <p:cNvPr id="39" name="TextBox 38">
-            <a:extLst>
-              <a:ext uri="{FF2B5EF4-FFF2-40B4-BE49-F238E27FC236}">
-                <a16:creationId xmlns:a16="http://schemas.microsoft.com/office/drawing/2014/main" id="{7A0397B8-ED92-4841-B203-66F2C2FEE6C5}"/>
-              </a:ext>
-            </a:extLst>
-          </p:cNvPr>
-          <p:cNvSpPr txBox="1"/>
-          <p:nvPr/>
-        </p:nvSpPr>
-        <p:spPr>
-          <a:xfrm>
-            <a:off x="10109784" y="3476799"/>
-            <a:ext cx="1364258" cy="369332"/>
-          </a:xfrm>
-          <a:prstGeom prst="rect">
-            <a:avLst/>
-          </a:prstGeom>
-          <a:noFill/>
-          <a:ln>
-            <a:solidFill>
-              <a:schemeClr val="tx1"/>
-            </a:solidFill>
-          </a:ln>
-        </p:spPr>
-        <p:txBody>
-          <a:bodyPr wrap="square" rtlCol="0">
-            <a:spAutoFit/>
-          </a:bodyPr>
-          <a:lstStyle/>
-          <a:p>
-            <a:pPr algn="ctr"/>
-            <a:r>
-              <a:rPr lang="en-US" dirty="0"/>
-              <a:t>About</a:t>
-            </a:r>
-          </a:p>
-        </p:txBody>
-      </p:sp>
-      <p:sp>
-        <p:nvSpPr>
-          <p:cNvPr id="40" name="TextBox 39">
-            <a:extLst>
-              <a:ext uri="{FF2B5EF4-FFF2-40B4-BE49-F238E27FC236}">
-                <a16:creationId xmlns:a16="http://schemas.microsoft.com/office/drawing/2014/main" id="{7CD6919F-CC9E-4F8C-ABD0-1976C657D1EB}"/>
-              </a:ext>
-            </a:extLst>
-          </p:cNvPr>
-          <p:cNvSpPr txBox="1"/>
-          <p:nvPr/>
-        </p:nvSpPr>
-        <p:spPr>
-          <a:xfrm>
-            <a:off x="8245684" y="3496001"/>
-            <a:ext cx="1554756" cy="369332"/>
-          </a:xfrm>
-          <a:prstGeom prst="rect">
-            <a:avLst/>
-          </a:prstGeom>
-          <a:noFill/>
-          <a:ln>
-            <a:solidFill>
-              <a:schemeClr val="tx1"/>
-            </a:solidFill>
-          </a:ln>
-        </p:spPr>
-        <p:txBody>
-          <a:bodyPr wrap="square" rtlCol="0">
-            <a:spAutoFit/>
-          </a:bodyPr>
-          <a:lstStyle/>
-          <a:p>
-            <a:pPr algn="ctr"/>
-            <a:r>
-              <a:rPr lang="en-US" dirty="0"/>
-              <a:t>References</a:t>
-            </a:r>
-          </a:p>
-        </p:txBody>
-      </p:sp>
-      <p:sp>
-        <p:nvSpPr>
-          <p:cNvPr id="41" name="TextBox 40">
-            <a:extLst>
-              <a:ext uri="{FF2B5EF4-FFF2-40B4-BE49-F238E27FC236}">
-                <a16:creationId xmlns:a16="http://schemas.microsoft.com/office/drawing/2014/main" id="{9498F8C1-9E26-4E74-808C-0DE12D2A9133}"/>
-              </a:ext>
-            </a:extLst>
-          </p:cNvPr>
-          <p:cNvSpPr txBox="1"/>
-          <p:nvPr/>
-        </p:nvSpPr>
-        <p:spPr>
-          <a:xfrm>
-            <a:off x="7859085" y="2676658"/>
-            <a:ext cx="1911291" cy="369332"/>
-          </a:xfrm>
-          <a:prstGeom prst="rect">
-            <a:avLst/>
-          </a:prstGeom>
-          <a:noFill/>
-          <a:ln>
-            <a:solidFill>
-              <a:schemeClr val="tx1"/>
-            </a:solidFill>
-          </a:ln>
-        </p:spPr>
-        <p:txBody>
-          <a:bodyPr wrap="square" rtlCol="0">
-            <a:spAutoFit/>
-          </a:bodyPr>
-          <a:lstStyle/>
-          <a:p>
-            <a:pPr algn="ctr"/>
-            <a:r>
-              <a:rPr lang="en-US" dirty="0"/>
-              <a:t>Home</a:t>
-            </a:r>
-          </a:p>
-        </p:txBody>
-      </p:sp>
-      <p:cxnSp>
-        <p:nvCxnSpPr>
-          <p:cNvPr id="43" name="Straight Connector 42">
-            <a:extLst>
-              <a:ext uri="{FF2B5EF4-FFF2-40B4-BE49-F238E27FC236}">
-                <a16:creationId xmlns:a16="http://schemas.microsoft.com/office/drawing/2014/main" id="{F2F9CABA-7E97-4E2F-A454-C8F31158D1A8}"/>
-              </a:ext>
-            </a:extLst>
-          </p:cNvPr>
-          <p:cNvCxnSpPr>
-            <a:cxnSpLocks/>
-            <a:stCxn id="4" idx="0"/>
-            <a:endCxn id="41" idx="2"/>
-          </p:cNvCxnSpPr>
-          <p:nvPr/>
-        </p:nvCxnSpPr>
-        <p:spPr>
-          <a:xfrm flipV="1">
-            <a:off x="6905539" y="3045990"/>
-            <a:ext cx="1909192" cy="430809"/>
-          </a:xfrm>
-          <a:prstGeom prst="line">
-            <a:avLst/>
-          </a:prstGeom>
-        </p:spPr>
-        <p:style>
-          <a:lnRef idx="1">
-            <a:schemeClr val="accent1"/>
-          </a:lnRef>
-          <a:fillRef idx="0">
-            <a:schemeClr val="accent1"/>
-          </a:fillRef>
-          <a:effectRef idx="0">
-            <a:schemeClr val="accent1"/>
-          </a:effectRef>
-          <a:fontRef idx="minor">
-            <a:schemeClr val="tx1"/>
-          </a:fontRef>
-        </p:style>
-      </p:cxnSp>
-      <p:cxnSp>
-        <p:nvCxnSpPr>
-          <p:cNvPr id="46" name="Straight Connector 45">
-            <a:extLst>
-              <a:ext uri="{FF2B5EF4-FFF2-40B4-BE49-F238E27FC236}">
-                <a16:creationId xmlns:a16="http://schemas.microsoft.com/office/drawing/2014/main" id="{225A76A6-AF9A-407A-AE7C-46EB14129710}"/>
-              </a:ext>
-            </a:extLst>
-          </p:cNvPr>
-          <p:cNvCxnSpPr>
-            <a:cxnSpLocks/>
-            <a:stCxn id="40" idx="0"/>
-            <a:endCxn id="41" idx="2"/>
-          </p:cNvCxnSpPr>
-          <p:nvPr/>
-        </p:nvCxnSpPr>
-        <p:spPr>
-          <a:xfrm flipH="1" flipV="1">
-            <a:off x="8814731" y="3045990"/>
-            <a:ext cx="208331" cy="450011"/>
-          </a:xfrm>
-          <a:prstGeom prst="line">
-            <a:avLst/>
-          </a:prstGeom>
-        </p:spPr>
-        <p:style>
-          <a:lnRef idx="1">
-            <a:schemeClr val="accent1"/>
-          </a:lnRef>
-          <a:fillRef idx="0">
-            <a:schemeClr val="accent1"/>
-          </a:fillRef>
-          <a:effectRef idx="0">
-            <a:schemeClr val="accent1"/>
-          </a:effectRef>
-          <a:fontRef idx="minor">
-            <a:schemeClr val="tx1"/>
-          </a:fontRef>
-        </p:style>
-      </p:cxnSp>
-      <p:cxnSp>
-        <p:nvCxnSpPr>
-          <p:cNvPr id="49" name="Straight Connector 48">
-            <a:extLst>
-              <a:ext uri="{FF2B5EF4-FFF2-40B4-BE49-F238E27FC236}">
-                <a16:creationId xmlns:a16="http://schemas.microsoft.com/office/drawing/2014/main" id="{6194BE01-A3B4-4379-BEAC-E5FBCEA7799F}"/>
-              </a:ext>
-            </a:extLst>
-          </p:cNvPr>
-          <p:cNvCxnSpPr>
-            <a:cxnSpLocks/>
-            <a:stCxn id="39" idx="0"/>
-            <a:endCxn id="41" idx="2"/>
-          </p:cNvCxnSpPr>
-          <p:nvPr/>
-        </p:nvCxnSpPr>
-        <p:spPr>
-          <a:xfrm flipH="1" flipV="1">
-            <a:off x="8814731" y="3045990"/>
-            <a:ext cx="1977182" cy="430809"/>
-          </a:xfrm>
-          <a:prstGeom prst="line">
-            <a:avLst/>
-          </a:prstGeom>
-        </p:spPr>
-        <p:style>
-          <a:lnRef idx="1">
-            <a:schemeClr val="accent1"/>
-          </a:lnRef>
-          <a:fillRef idx="0">
-            <a:schemeClr val="accent1"/>
-          </a:fillRef>
-          <a:effectRef idx="0">
-            <a:schemeClr val="accent1"/>
-          </a:effectRef>
-          <a:fontRef idx="minor">
-            <a:schemeClr val="tx1"/>
-          </a:fontRef>
-        </p:style>
-      </p:cxnSp>
+            <a:r>
+              <a:rPr lang="en-US" dirty="0"/>
+              <a:t>“Info” panels explaining what/why</a:t>
+            </a:r>
+          </a:p>
+          <a:p>
+            <a:pPr lvl="1"/>
+            <a:r>
+              <a:rPr lang="en-US" dirty="0"/>
+              <a:t>Context (why) of the application (first page)</a:t>
+            </a:r>
+          </a:p>
+          <a:p>
+            <a:pPr lvl="1"/>
+            <a:r>
+              <a:rPr lang="en-US" dirty="0"/>
+              <a:t>Background on </a:t>
+            </a:r>
+            <a:r>
+              <a:rPr lang="en-US" dirty="0" err="1"/>
+              <a:t>PLAsTiCC</a:t>
+            </a:r>
+            <a:endParaRPr lang="en-US" dirty="0"/>
+          </a:p>
+          <a:p>
+            <a:pPr lvl="1"/>
+            <a:r>
+              <a:rPr lang="en-US" dirty="0"/>
+              <a:t>Metrics – why important and reference</a:t>
+            </a:r>
+          </a:p>
+          <a:p>
+            <a:pPr lvl="1"/>
+            <a:r>
+              <a:rPr lang="en-US" dirty="0"/>
+              <a:t>Data Processing – constructing the model (slide)</a:t>
+            </a:r>
+          </a:p>
+          <a:p>
+            <a:pPr lvl="1"/>
+            <a:r>
+              <a:rPr lang="en-US" dirty="0"/>
+              <a:t>Dataset – timeseries and size/scale</a:t>
+            </a:r>
+          </a:p>
+          <a:p>
+            <a:pPr lvl="1"/>
+            <a:r>
+              <a:rPr lang="en-US" dirty="0" err="1"/>
+              <a:t>Tensorflow</a:t>
+            </a:r>
+            <a:r>
+              <a:rPr lang="en-US" dirty="0"/>
+              <a:t> Model – </a:t>
+            </a:r>
+            <a:r>
+              <a:rPr lang="en-US" dirty="0" err="1"/>
+              <a:t>B.Trotta</a:t>
+            </a:r>
+            <a:r>
+              <a:rPr lang="en-US" dirty="0"/>
+              <a:t> and </a:t>
+            </a:r>
+            <a:r>
+              <a:rPr lang="en-US" dirty="0" err="1"/>
+              <a:t>K.Boone</a:t>
+            </a:r>
+            <a:r>
+              <a:rPr lang="en-US" dirty="0"/>
+              <a:t> approach summary and other approaches used.  Reference my other </a:t>
+            </a:r>
+            <a:r>
+              <a:rPr lang="en-US" dirty="0" err="1"/>
+              <a:t>slideset</a:t>
+            </a:r>
+            <a:r>
+              <a:rPr lang="en-US" dirty="0"/>
+              <a:t>.</a:t>
+            </a:r>
+          </a:p>
+          <a:p>
+            <a:pPr lvl="1"/>
+            <a:r>
+              <a:rPr lang="en-US" dirty="0" err="1"/>
+              <a:t>Tensorflow</a:t>
+            </a:r>
+            <a:r>
+              <a:rPr lang="en-US" dirty="0"/>
+              <a:t> background</a:t>
+            </a:r>
+          </a:p>
+          <a:p>
+            <a:pPr lvl="1"/>
+            <a:r>
+              <a:rPr lang="en-US" dirty="0"/>
+              <a:t>Structure of website (slides from this presentation)</a:t>
+            </a:r>
+          </a:p>
+          <a:p>
+            <a:r>
+              <a:rPr lang="en-US" dirty="0"/>
+              <a:t>“Popup” on </a:t>
+            </a:r>
+            <a:r>
+              <a:rPr lang="en-US" dirty="0" err="1"/>
+              <a:t>make_bid</a:t>
+            </a:r>
+            <a:r>
+              <a:rPr lang="en-US" dirty="0"/>
+              <a:t> page - highlight merge of TensorFlow ML results with local database</a:t>
+            </a:r>
+          </a:p>
+          <a:p>
+            <a:pPr lvl="1"/>
+            <a:endParaRPr lang="en-US" dirty="0"/>
+          </a:p>
+          <a:p>
+            <a:pPr marL="457200" lvl="1" indent="0">
+              <a:buNone/>
+            </a:pPr>
+            <a:endParaRPr lang="en-US" dirty="0"/>
+          </a:p>
+        </p:txBody>
+      </p:sp>
     </p:spTree>
     <p:extLst>
       <p:ext uri="{BB962C8B-B14F-4D97-AF65-F5344CB8AC3E}">
-        <p14:creationId xmlns:p14="http://schemas.microsoft.com/office/powerpoint/2010/main" val="2402506783"/>
+        <p14:creationId xmlns:p14="http://schemas.microsoft.com/office/powerpoint/2010/main" val="3716969535"/>
       </p:ext>
     </p:extLst>
   </p:cSld>
@@ -5563,6 +4941,822 @@
           <p:cNvPr id="2" name="Title 1">
             <a:extLst>
               <a:ext uri="{FF2B5EF4-FFF2-40B4-BE49-F238E27FC236}">
+                <a16:creationId xmlns:a16="http://schemas.microsoft.com/office/drawing/2014/main" id="{6DE6F54D-E928-44DE-963C-D655747854A9}"/>
+              </a:ext>
+            </a:extLst>
+          </p:cNvPr>
+          <p:cNvSpPr>
+            <a:spLocks noGrp="1"/>
+          </p:cNvSpPr>
+          <p:nvPr>
+            <p:ph type="title"/>
+          </p:nvPr>
+        </p:nvSpPr>
+        <p:spPr>
+          <a:xfrm>
+            <a:off x="708171" y="287808"/>
+            <a:ext cx="10515600" cy="1325563"/>
+          </a:xfrm>
+        </p:spPr>
+        <p:txBody>
+          <a:bodyPr/>
+          <a:lstStyle/>
+          <a:p>
+            <a:r>
+              <a:rPr lang="en-US" dirty="0"/>
+              <a:t>Proposed Site Map</a:t>
+            </a:r>
+          </a:p>
+        </p:txBody>
+      </p:sp>
+      <p:sp>
+        <p:nvSpPr>
+          <p:cNvPr id="4" name="TextBox 3">
+            <a:extLst>
+              <a:ext uri="{FF2B5EF4-FFF2-40B4-BE49-F238E27FC236}">
+                <a16:creationId xmlns:a16="http://schemas.microsoft.com/office/drawing/2014/main" id="{B40D84BE-C8F7-4B2B-881E-88214C9646CD}"/>
+              </a:ext>
+            </a:extLst>
+          </p:cNvPr>
+          <p:cNvSpPr txBox="1"/>
+          <p:nvPr/>
+        </p:nvSpPr>
+        <p:spPr>
+          <a:xfrm>
+            <a:off x="5949893" y="3476799"/>
+            <a:ext cx="1911291" cy="369332"/>
+          </a:xfrm>
+          <a:prstGeom prst="rect">
+            <a:avLst/>
+          </a:prstGeom>
+          <a:noFill/>
+          <a:ln>
+            <a:solidFill>
+              <a:schemeClr val="tx1"/>
+            </a:solidFill>
+          </a:ln>
+        </p:spPr>
+        <p:txBody>
+          <a:bodyPr wrap="square" rtlCol="0">
+            <a:spAutoFit/>
+          </a:bodyPr>
+          <a:lstStyle/>
+          <a:p>
+            <a:pPr algn="ctr"/>
+            <a:r>
+              <a:rPr lang="en-US" dirty="0"/>
+              <a:t>Leaderboard</a:t>
+            </a:r>
+          </a:p>
+        </p:txBody>
+      </p:sp>
+      <p:sp>
+        <p:nvSpPr>
+          <p:cNvPr id="5" name="TextBox 4">
+            <a:extLst>
+              <a:ext uri="{FF2B5EF4-FFF2-40B4-BE49-F238E27FC236}">
+                <a16:creationId xmlns:a16="http://schemas.microsoft.com/office/drawing/2014/main" id="{43881D1D-F294-4E47-8457-E91C07EB98A8}"/>
+              </a:ext>
+            </a:extLst>
+          </p:cNvPr>
+          <p:cNvSpPr txBox="1"/>
+          <p:nvPr/>
+        </p:nvSpPr>
+        <p:spPr>
+          <a:xfrm>
+            <a:off x="4488109" y="1741020"/>
+            <a:ext cx="1459684" cy="369332"/>
+          </a:xfrm>
+          <a:prstGeom prst="rect">
+            <a:avLst/>
+          </a:prstGeom>
+          <a:noFill/>
+          <a:ln>
+            <a:solidFill>
+              <a:schemeClr val="tx1"/>
+            </a:solidFill>
+          </a:ln>
+        </p:spPr>
+        <p:txBody>
+          <a:bodyPr wrap="square" rtlCol="0">
+            <a:spAutoFit/>
+          </a:bodyPr>
+          <a:lstStyle/>
+          <a:p>
+            <a:pPr algn="ctr"/>
+            <a:r>
+              <a:rPr lang="en-US" dirty="0"/>
+              <a:t>Login</a:t>
+            </a:r>
+          </a:p>
+        </p:txBody>
+      </p:sp>
+      <p:sp>
+        <p:nvSpPr>
+          <p:cNvPr id="7" name="TextBox 6">
+            <a:extLst>
+              <a:ext uri="{FF2B5EF4-FFF2-40B4-BE49-F238E27FC236}">
+                <a16:creationId xmlns:a16="http://schemas.microsoft.com/office/drawing/2014/main" id="{E2C353D0-78CA-42F0-98BB-384525491763}"/>
+              </a:ext>
+            </a:extLst>
+          </p:cNvPr>
+          <p:cNvSpPr txBox="1"/>
+          <p:nvPr/>
+        </p:nvSpPr>
+        <p:spPr>
+          <a:xfrm>
+            <a:off x="6175696" y="4379455"/>
+            <a:ext cx="1491841" cy="369332"/>
+          </a:xfrm>
+          <a:prstGeom prst="rect">
+            <a:avLst/>
+          </a:prstGeom>
+          <a:noFill/>
+          <a:ln>
+            <a:solidFill>
+              <a:schemeClr val="tx1"/>
+            </a:solidFill>
+          </a:ln>
+        </p:spPr>
+        <p:txBody>
+          <a:bodyPr wrap="square" rtlCol="0">
+            <a:spAutoFit/>
+          </a:bodyPr>
+          <a:lstStyle/>
+          <a:p>
+            <a:pPr algn="ctr"/>
+            <a:r>
+              <a:rPr lang="en-US" dirty="0"/>
+              <a:t>Choose a Star</a:t>
+            </a:r>
+          </a:p>
+        </p:txBody>
+      </p:sp>
+      <p:sp>
+        <p:nvSpPr>
+          <p:cNvPr id="8" name="TextBox 7">
+            <a:extLst>
+              <a:ext uri="{FF2B5EF4-FFF2-40B4-BE49-F238E27FC236}">
+                <a16:creationId xmlns:a16="http://schemas.microsoft.com/office/drawing/2014/main" id="{4E26735B-D9F6-4DD4-B3BF-A0A56E156A22}"/>
+              </a:ext>
+            </a:extLst>
+          </p:cNvPr>
+          <p:cNvSpPr txBox="1"/>
+          <p:nvPr/>
+        </p:nvSpPr>
+        <p:spPr>
+          <a:xfrm>
+            <a:off x="5965971" y="5097445"/>
+            <a:ext cx="1911291" cy="369332"/>
+          </a:xfrm>
+          <a:prstGeom prst="rect">
+            <a:avLst/>
+          </a:prstGeom>
+          <a:noFill/>
+          <a:ln>
+            <a:solidFill>
+              <a:schemeClr val="tx1"/>
+            </a:solidFill>
+          </a:ln>
+        </p:spPr>
+        <p:txBody>
+          <a:bodyPr wrap="square" rtlCol="0">
+            <a:spAutoFit/>
+          </a:bodyPr>
+          <a:lstStyle/>
+          <a:p>
+            <a:pPr algn="ctr"/>
+            <a:r>
+              <a:rPr lang="en-US" dirty="0"/>
+              <a:t>Analyze / Classify</a:t>
+            </a:r>
+          </a:p>
+        </p:txBody>
+      </p:sp>
+      <p:sp>
+        <p:nvSpPr>
+          <p:cNvPr id="9" name="TextBox 8">
+            <a:extLst>
+              <a:ext uri="{FF2B5EF4-FFF2-40B4-BE49-F238E27FC236}">
+                <a16:creationId xmlns:a16="http://schemas.microsoft.com/office/drawing/2014/main" id="{2A83839C-3730-4E9F-AF9C-E5D31978CD8A}"/>
+              </a:ext>
+            </a:extLst>
+          </p:cNvPr>
+          <p:cNvSpPr txBox="1"/>
+          <p:nvPr/>
+        </p:nvSpPr>
+        <p:spPr>
+          <a:xfrm>
+            <a:off x="2467240" y="2733883"/>
+            <a:ext cx="1459684" cy="369332"/>
+          </a:xfrm>
+          <a:prstGeom prst="rect">
+            <a:avLst/>
+          </a:prstGeom>
+          <a:noFill/>
+          <a:ln>
+            <a:solidFill>
+              <a:schemeClr val="tx1"/>
+            </a:solidFill>
+          </a:ln>
+        </p:spPr>
+        <p:txBody>
+          <a:bodyPr wrap="square" rtlCol="0">
+            <a:spAutoFit/>
+          </a:bodyPr>
+          <a:lstStyle/>
+          <a:p>
+            <a:pPr algn="ctr"/>
+            <a:r>
+              <a:rPr lang="en-US" dirty="0"/>
+              <a:t>Admin</a:t>
+            </a:r>
+          </a:p>
+        </p:txBody>
+      </p:sp>
+      <p:sp>
+        <p:nvSpPr>
+          <p:cNvPr id="10" name="TextBox 9">
+            <a:extLst>
+              <a:ext uri="{FF2B5EF4-FFF2-40B4-BE49-F238E27FC236}">
+                <a16:creationId xmlns:a16="http://schemas.microsoft.com/office/drawing/2014/main" id="{BFA04579-982B-4096-90E8-F8D4106059AF}"/>
+              </a:ext>
+            </a:extLst>
+          </p:cNvPr>
+          <p:cNvSpPr txBox="1"/>
+          <p:nvPr/>
+        </p:nvSpPr>
+        <p:spPr>
+          <a:xfrm>
+            <a:off x="957222" y="3684918"/>
+            <a:ext cx="1979802" cy="369332"/>
+          </a:xfrm>
+          <a:prstGeom prst="rect">
+            <a:avLst/>
+          </a:prstGeom>
+          <a:noFill/>
+          <a:ln>
+            <a:solidFill>
+              <a:schemeClr val="tx1"/>
+            </a:solidFill>
+          </a:ln>
+        </p:spPr>
+        <p:txBody>
+          <a:bodyPr wrap="square" rtlCol="0">
+            <a:spAutoFit/>
+          </a:bodyPr>
+          <a:lstStyle/>
+          <a:p>
+            <a:pPr algn="ctr"/>
+            <a:r>
+              <a:rPr lang="en-US" dirty="0"/>
+              <a:t>Users/Groups</a:t>
+            </a:r>
+          </a:p>
+        </p:txBody>
+      </p:sp>
+      <p:sp>
+        <p:nvSpPr>
+          <p:cNvPr id="11" name="TextBox 10">
+            <a:extLst>
+              <a:ext uri="{FF2B5EF4-FFF2-40B4-BE49-F238E27FC236}">
+                <a16:creationId xmlns:a16="http://schemas.microsoft.com/office/drawing/2014/main" id="{53644665-8842-40DA-B829-57D70D02E186}"/>
+              </a:ext>
+            </a:extLst>
+          </p:cNvPr>
+          <p:cNvSpPr txBox="1"/>
+          <p:nvPr/>
+        </p:nvSpPr>
+        <p:spPr>
+          <a:xfrm>
+            <a:off x="3287962" y="3684918"/>
+            <a:ext cx="1979802" cy="369332"/>
+          </a:xfrm>
+          <a:prstGeom prst="rect">
+            <a:avLst/>
+          </a:prstGeom>
+          <a:noFill/>
+          <a:ln>
+            <a:solidFill>
+              <a:schemeClr val="tx1"/>
+            </a:solidFill>
+          </a:ln>
+        </p:spPr>
+        <p:txBody>
+          <a:bodyPr wrap="square" rtlCol="0">
+            <a:spAutoFit/>
+          </a:bodyPr>
+          <a:lstStyle/>
+          <a:p>
+            <a:pPr algn="ctr"/>
+            <a:r>
+              <a:rPr lang="en-US" dirty="0"/>
+              <a:t>Database</a:t>
+            </a:r>
+          </a:p>
+        </p:txBody>
+      </p:sp>
+      <p:cxnSp>
+        <p:nvCxnSpPr>
+          <p:cNvPr id="13" name="Straight Connector 12">
+            <a:extLst>
+              <a:ext uri="{FF2B5EF4-FFF2-40B4-BE49-F238E27FC236}">
+                <a16:creationId xmlns:a16="http://schemas.microsoft.com/office/drawing/2014/main" id="{2049117A-3189-4D6C-B59E-EFF184DED37B}"/>
+              </a:ext>
+            </a:extLst>
+          </p:cNvPr>
+          <p:cNvCxnSpPr>
+            <a:cxnSpLocks/>
+            <a:stCxn id="5" idx="2"/>
+            <a:endCxn id="41" idx="0"/>
+          </p:cNvCxnSpPr>
+          <p:nvPr/>
+        </p:nvCxnSpPr>
+        <p:spPr>
+          <a:xfrm>
+            <a:off x="5217951" y="2110352"/>
+            <a:ext cx="1685488" cy="533324"/>
+          </a:xfrm>
+          <a:prstGeom prst="line">
+            <a:avLst/>
+          </a:prstGeom>
+        </p:spPr>
+        <p:style>
+          <a:lnRef idx="1">
+            <a:schemeClr val="accent1"/>
+          </a:lnRef>
+          <a:fillRef idx="0">
+            <a:schemeClr val="accent1"/>
+          </a:fillRef>
+          <a:effectRef idx="0">
+            <a:schemeClr val="accent1"/>
+          </a:effectRef>
+          <a:fontRef idx="minor">
+            <a:schemeClr val="tx1"/>
+          </a:fontRef>
+        </p:style>
+      </p:cxnSp>
+      <p:cxnSp>
+        <p:nvCxnSpPr>
+          <p:cNvPr id="15" name="Straight Connector 14">
+            <a:extLst>
+              <a:ext uri="{FF2B5EF4-FFF2-40B4-BE49-F238E27FC236}">
+                <a16:creationId xmlns:a16="http://schemas.microsoft.com/office/drawing/2014/main" id="{0F9A1D4A-7D89-41AD-B5E0-4F8E91EE2AC4}"/>
+              </a:ext>
+            </a:extLst>
+          </p:cNvPr>
+          <p:cNvCxnSpPr>
+            <a:cxnSpLocks/>
+            <a:stCxn id="7" idx="0"/>
+            <a:endCxn id="4" idx="2"/>
+          </p:cNvCxnSpPr>
+          <p:nvPr/>
+        </p:nvCxnSpPr>
+        <p:spPr>
+          <a:xfrm flipH="1" flipV="1">
+            <a:off x="6905539" y="3846131"/>
+            <a:ext cx="16078" cy="533323"/>
+          </a:xfrm>
+          <a:prstGeom prst="line">
+            <a:avLst/>
+          </a:prstGeom>
+        </p:spPr>
+        <p:style>
+          <a:lnRef idx="1">
+            <a:schemeClr val="accent1"/>
+          </a:lnRef>
+          <a:fillRef idx="0">
+            <a:schemeClr val="accent1"/>
+          </a:fillRef>
+          <a:effectRef idx="0">
+            <a:schemeClr val="accent1"/>
+          </a:effectRef>
+          <a:fontRef idx="minor">
+            <a:schemeClr val="tx1"/>
+          </a:fontRef>
+        </p:style>
+      </p:cxnSp>
+      <p:cxnSp>
+        <p:nvCxnSpPr>
+          <p:cNvPr id="18" name="Straight Connector 17">
+            <a:extLst>
+              <a:ext uri="{FF2B5EF4-FFF2-40B4-BE49-F238E27FC236}">
+                <a16:creationId xmlns:a16="http://schemas.microsoft.com/office/drawing/2014/main" id="{431CE483-D9FB-47EE-8916-2D56E6117021}"/>
+              </a:ext>
+            </a:extLst>
+          </p:cNvPr>
+          <p:cNvCxnSpPr>
+            <a:cxnSpLocks/>
+            <a:stCxn id="8" idx="0"/>
+            <a:endCxn id="7" idx="2"/>
+          </p:cNvCxnSpPr>
+          <p:nvPr/>
+        </p:nvCxnSpPr>
+        <p:spPr>
+          <a:xfrm flipV="1">
+            <a:off x="6921617" y="4769227"/>
+            <a:ext cx="0" cy="328218"/>
+          </a:xfrm>
+          <a:prstGeom prst="line">
+            <a:avLst/>
+          </a:prstGeom>
+        </p:spPr>
+        <p:style>
+          <a:lnRef idx="1">
+            <a:schemeClr val="accent1"/>
+          </a:lnRef>
+          <a:fillRef idx="0">
+            <a:schemeClr val="accent1"/>
+          </a:fillRef>
+          <a:effectRef idx="0">
+            <a:schemeClr val="accent1"/>
+          </a:effectRef>
+          <a:fontRef idx="minor">
+            <a:schemeClr val="tx1"/>
+          </a:fontRef>
+        </p:style>
+      </p:cxnSp>
+      <p:cxnSp>
+        <p:nvCxnSpPr>
+          <p:cNvPr id="21" name="Straight Connector 20">
+            <a:extLst>
+              <a:ext uri="{FF2B5EF4-FFF2-40B4-BE49-F238E27FC236}">
+                <a16:creationId xmlns:a16="http://schemas.microsoft.com/office/drawing/2014/main" id="{10B4C6B9-8144-4788-B7CE-0AB403499508}"/>
+              </a:ext>
+            </a:extLst>
+          </p:cNvPr>
+          <p:cNvCxnSpPr>
+            <a:cxnSpLocks/>
+            <a:stCxn id="9" idx="0"/>
+            <a:endCxn id="5" idx="2"/>
+          </p:cNvCxnSpPr>
+          <p:nvPr/>
+        </p:nvCxnSpPr>
+        <p:spPr>
+          <a:xfrm flipV="1">
+            <a:off x="3197082" y="2110352"/>
+            <a:ext cx="2020869" cy="623531"/>
+          </a:xfrm>
+          <a:prstGeom prst="line">
+            <a:avLst/>
+          </a:prstGeom>
+        </p:spPr>
+        <p:style>
+          <a:lnRef idx="1">
+            <a:schemeClr val="accent1"/>
+          </a:lnRef>
+          <a:fillRef idx="0">
+            <a:schemeClr val="accent1"/>
+          </a:fillRef>
+          <a:effectRef idx="0">
+            <a:schemeClr val="accent1"/>
+          </a:effectRef>
+          <a:fontRef idx="minor">
+            <a:schemeClr val="tx1"/>
+          </a:fontRef>
+        </p:style>
+      </p:cxnSp>
+      <p:cxnSp>
+        <p:nvCxnSpPr>
+          <p:cNvPr id="24" name="Straight Connector 23">
+            <a:extLst>
+              <a:ext uri="{FF2B5EF4-FFF2-40B4-BE49-F238E27FC236}">
+                <a16:creationId xmlns:a16="http://schemas.microsoft.com/office/drawing/2014/main" id="{C064B7BD-9E88-47C3-B054-895D5D289738}"/>
+              </a:ext>
+            </a:extLst>
+          </p:cNvPr>
+          <p:cNvCxnSpPr>
+            <a:cxnSpLocks/>
+            <a:stCxn id="11" idx="0"/>
+            <a:endCxn id="9" idx="2"/>
+          </p:cNvCxnSpPr>
+          <p:nvPr/>
+        </p:nvCxnSpPr>
+        <p:spPr>
+          <a:xfrm flipH="1" flipV="1">
+            <a:off x="3197082" y="3103215"/>
+            <a:ext cx="1080781" cy="581703"/>
+          </a:xfrm>
+          <a:prstGeom prst="line">
+            <a:avLst/>
+          </a:prstGeom>
+        </p:spPr>
+        <p:style>
+          <a:lnRef idx="1">
+            <a:schemeClr val="accent1"/>
+          </a:lnRef>
+          <a:fillRef idx="0">
+            <a:schemeClr val="accent1"/>
+          </a:fillRef>
+          <a:effectRef idx="0">
+            <a:schemeClr val="accent1"/>
+          </a:effectRef>
+          <a:fontRef idx="minor">
+            <a:schemeClr val="tx1"/>
+          </a:fontRef>
+        </p:style>
+      </p:cxnSp>
+      <p:cxnSp>
+        <p:nvCxnSpPr>
+          <p:cNvPr id="27" name="Straight Connector 26">
+            <a:extLst>
+              <a:ext uri="{FF2B5EF4-FFF2-40B4-BE49-F238E27FC236}">
+                <a16:creationId xmlns:a16="http://schemas.microsoft.com/office/drawing/2014/main" id="{28D6298D-BF4E-4AB1-A666-335A8DC783F0}"/>
+              </a:ext>
+            </a:extLst>
+          </p:cNvPr>
+          <p:cNvCxnSpPr>
+            <a:cxnSpLocks/>
+            <a:stCxn id="10" idx="0"/>
+            <a:endCxn id="9" idx="2"/>
+          </p:cNvCxnSpPr>
+          <p:nvPr/>
+        </p:nvCxnSpPr>
+        <p:spPr>
+          <a:xfrm flipV="1">
+            <a:off x="1947123" y="3103215"/>
+            <a:ext cx="1249959" cy="581703"/>
+          </a:xfrm>
+          <a:prstGeom prst="line">
+            <a:avLst/>
+          </a:prstGeom>
+        </p:spPr>
+        <p:style>
+          <a:lnRef idx="1">
+            <a:schemeClr val="accent1"/>
+          </a:lnRef>
+          <a:fillRef idx="0">
+            <a:schemeClr val="accent1"/>
+          </a:fillRef>
+          <a:effectRef idx="0">
+            <a:schemeClr val="accent1"/>
+          </a:effectRef>
+          <a:fontRef idx="minor">
+            <a:schemeClr val="tx1"/>
+          </a:fontRef>
+        </p:style>
+      </p:cxnSp>
+      <p:sp>
+        <p:nvSpPr>
+          <p:cNvPr id="40" name="TextBox 39">
+            <a:extLst>
+              <a:ext uri="{FF2B5EF4-FFF2-40B4-BE49-F238E27FC236}">
+                <a16:creationId xmlns:a16="http://schemas.microsoft.com/office/drawing/2014/main" id="{7CD6919F-CC9E-4F8C-ABD0-1976C657D1EB}"/>
+              </a:ext>
+            </a:extLst>
+          </p:cNvPr>
+          <p:cNvSpPr txBox="1"/>
+          <p:nvPr/>
+        </p:nvSpPr>
+        <p:spPr>
+          <a:xfrm>
+            <a:off x="8588926" y="2589605"/>
+            <a:ext cx="1156970" cy="2862322"/>
+          </a:xfrm>
+          <a:prstGeom prst="rect">
+            <a:avLst/>
+          </a:prstGeom>
+          <a:noFill/>
+          <a:ln>
+            <a:solidFill>
+              <a:schemeClr val="tx1"/>
+            </a:solidFill>
+          </a:ln>
+        </p:spPr>
+        <p:txBody>
+          <a:bodyPr wrap="square" rtlCol="0">
+            <a:spAutoFit/>
+          </a:bodyPr>
+          <a:lstStyle/>
+          <a:p>
+            <a:pPr algn="ctr"/>
+            <a:r>
+              <a:rPr lang="en-US" dirty="0"/>
+              <a:t>Info Panel</a:t>
+            </a:r>
+          </a:p>
+          <a:p>
+            <a:pPr algn="ctr"/>
+            <a:r>
+              <a:rPr lang="en-US" dirty="0"/>
+              <a:t>.</a:t>
+            </a:r>
+          </a:p>
+          <a:p>
+            <a:pPr algn="ctr"/>
+            <a:r>
+              <a:rPr lang="en-US" dirty="0"/>
+              <a:t>.</a:t>
+            </a:r>
+          </a:p>
+          <a:p>
+            <a:pPr algn="ctr"/>
+            <a:r>
+              <a:rPr lang="en-US" dirty="0"/>
+              <a:t>.</a:t>
+            </a:r>
+          </a:p>
+          <a:p>
+            <a:pPr algn="ctr"/>
+            <a:r>
+              <a:rPr lang="en-US" dirty="0"/>
+              <a:t>.</a:t>
+            </a:r>
+          </a:p>
+          <a:p>
+            <a:pPr algn="ctr"/>
+            <a:r>
+              <a:rPr lang="en-US" dirty="0"/>
+              <a:t>.</a:t>
+            </a:r>
+          </a:p>
+          <a:p>
+            <a:pPr algn="ctr"/>
+            <a:r>
+              <a:rPr lang="en-US" dirty="0"/>
+              <a:t>.</a:t>
+            </a:r>
+          </a:p>
+          <a:p>
+            <a:pPr algn="ctr"/>
+            <a:r>
+              <a:rPr lang="en-US" dirty="0"/>
+              <a:t>.</a:t>
+            </a:r>
+          </a:p>
+          <a:p>
+            <a:pPr algn="ctr"/>
+            <a:r>
+              <a:rPr lang="en-US" dirty="0"/>
+              <a:t>.</a:t>
+            </a:r>
+          </a:p>
+          <a:p>
+            <a:pPr algn="ctr"/>
+            <a:r>
+              <a:rPr lang="en-US" dirty="0"/>
+              <a:t>.</a:t>
+            </a:r>
+          </a:p>
+        </p:txBody>
+      </p:sp>
+      <p:sp>
+        <p:nvSpPr>
+          <p:cNvPr id="41" name="TextBox 40">
+            <a:extLst>
+              <a:ext uri="{FF2B5EF4-FFF2-40B4-BE49-F238E27FC236}">
+                <a16:creationId xmlns:a16="http://schemas.microsoft.com/office/drawing/2014/main" id="{9498F8C1-9E26-4E74-808C-0DE12D2A9133}"/>
+              </a:ext>
+            </a:extLst>
+          </p:cNvPr>
+          <p:cNvSpPr txBox="1"/>
+          <p:nvPr/>
+        </p:nvSpPr>
+        <p:spPr>
+          <a:xfrm>
+            <a:off x="5947793" y="2643676"/>
+            <a:ext cx="1911291" cy="369332"/>
+          </a:xfrm>
+          <a:prstGeom prst="rect">
+            <a:avLst/>
+          </a:prstGeom>
+          <a:noFill/>
+          <a:ln>
+            <a:solidFill>
+              <a:schemeClr val="tx1"/>
+            </a:solidFill>
+          </a:ln>
+        </p:spPr>
+        <p:txBody>
+          <a:bodyPr wrap="square" rtlCol="0">
+            <a:spAutoFit/>
+          </a:bodyPr>
+          <a:lstStyle/>
+          <a:p>
+            <a:pPr algn="ctr"/>
+            <a:r>
+              <a:rPr lang="en-US" dirty="0"/>
+              <a:t>Home</a:t>
+            </a:r>
+          </a:p>
+        </p:txBody>
+      </p:sp>
+      <p:cxnSp>
+        <p:nvCxnSpPr>
+          <p:cNvPr id="43" name="Straight Connector 42">
+            <a:extLst>
+              <a:ext uri="{FF2B5EF4-FFF2-40B4-BE49-F238E27FC236}">
+                <a16:creationId xmlns:a16="http://schemas.microsoft.com/office/drawing/2014/main" id="{F2F9CABA-7E97-4E2F-A454-C8F31158D1A8}"/>
+              </a:ext>
+            </a:extLst>
+          </p:cNvPr>
+          <p:cNvCxnSpPr>
+            <a:cxnSpLocks/>
+            <a:stCxn id="4" idx="0"/>
+            <a:endCxn id="41" idx="2"/>
+          </p:cNvCxnSpPr>
+          <p:nvPr/>
+        </p:nvCxnSpPr>
+        <p:spPr>
+          <a:xfrm flipH="1" flipV="1">
+            <a:off x="6903439" y="3013008"/>
+            <a:ext cx="2100" cy="463791"/>
+          </a:xfrm>
+          <a:prstGeom prst="line">
+            <a:avLst/>
+          </a:prstGeom>
+        </p:spPr>
+        <p:style>
+          <a:lnRef idx="1">
+            <a:schemeClr val="accent1"/>
+          </a:lnRef>
+          <a:fillRef idx="0">
+            <a:schemeClr val="accent1"/>
+          </a:fillRef>
+          <a:effectRef idx="0">
+            <a:schemeClr val="accent1"/>
+          </a:effectRef>
+          <a:fontRef idx="minor">
+            <a:schemeClr val="tx1"/>
+          </a:fontRef>
+        </p:style>
+      </p:cxnSp>
+      <p:sp>
+        <p:nvSpPr>
+          <p:cNvPr id="30" name="TextBox 29">
+            <a:extLst>
+              <a:ext uri="{FF2B5EF4-FFF2-40B4-BE49-F238E27FC236}">
+                <a16:creationId xmlns:a16="http://schemas.microsoft.com/office/drawing/2014/main" id="{0F5F5835-857C-499B-B599-DD773A7BE13F}"/>
+              </a:ext>
+            </a:extLst>
+          </p:cNvPr>
+          <p:cNvSpPr txBox="1"/>
+          <p:nvPr/>
+        </p:nvSpPr>
+        <p:spPr>
+          <a:xfrm>
+            <a:off x="7667537" y="4369118"/>
+            <a:ext cx="711664" cy="246221"/>
+          </a:xfrm>
+          <a:prstGeom prst="rect">
+            <a:avLst/>
+          </a:prstGeom>
+          <a:noFill/>
+          <a:ln>
+            <a:solidFill>
+              <a:schemeClr val="tx1"/>
+            </a:solidFill>
+          </a:ln>
+        </p:spPr>
+        <p:txBody>
+          <a:bodyPr wrap="square" rtlCol="0">
+            <a:spAutoFit/>
+          </a:bodyPr>
+          <a:lstStyle/>
+          <a:p>
+            <a:pPr algn="ctr"/>
+            <a:r>
+              <a:rPr lang="en-US" sz="1000" dirty="0"/>
+              <a:t>Popup</a:t>
+            </a:r>
+          </a:p>
+        </p:txBody>
+      </p:sp>
+    </p:spTree>
+    <p:extLst>
+      <p:ext uri="{BB962C8B-B14F-4D97-AF65-F5344CB8AC3E}">
+        <p14:creationId xmlns:p14="http://schemas.microsoft.com/office/powerpoint/2010/main" val="2402506783"/>
+      </p:ext>
+    </p:extLst>
+  </p:cSld>
+  <p:clrMapOvr>
+    <a:masterClrMapping/>
+  </p:clrMapOvr>
+</p:sld>
+</file>
+
+<file path=ppt/slides/slide17.xml><?xml version="1.0" encoding="utf-8"?>
+<p:sld xmlns:a="http://schemas.openxmlformats.org/drawingml/2006/main" xmlns:r="http://schemas.openxmlformats.org/officeDocument/2006/relationships" xmlns:p="http://schemas.openxmlformats.org/presentationml/2006/main">
+  <p:cSld>
+    <p:spTree>
+      <p:nvGrpSpPr>
+        <p:cNvPr id="1" name=""/>
+        <p:cNvGrpSpPr/>
+        <p:nvPr/>
+      </p:nvGrpSpPr>
+      <p:grpSpPr>
+        <a:xfrm>
+          <a:off x="0" y="0"/>
+          <a:ext cx="0" cy="0"/>
+          <a:chOff x="0" y="0"/>
+          <a:chExt cx="0" cy="0"/>
+        </a:xfrm>
+      </p:grpSpPr>
+      <p:sp>
+        <p:nvSpPr>
+          <p:cNvPr id="2" name="Title 1">
+            <a:extLst>
+              <a:ext uri="{FF2B5EF4-FFF2-40B4-BE49-F238E27FC236}">
                 <a16:creationId xmlns:a16="http://schemas.microsoft.com/office/drawing/2014/main" id="{B3A7D6CB-691C-464E-A917-0E859492EA88}"/>
               </a:ext>
             </a:extLst>
@@ -5635,7 +5829,7 @@
 </p:sld>
 </file>
 
-<file path=ppt/slides/slide17.xml><?xml version="1.0" encoding="utf-8"?>
+<file path=ppt/slides/slide18.xml><?xml version="1.0" encoding="utf-8"?>
 <p:sld xmlns:a="http://schemas.openxmlformats.org/drawingml/2006/main" xmlns:r="http://schemas.openxmlformats.org/officeDocument/2006/relationships" xmlns:p="http://schemas.openxmlformats.org/presentationml/2006/main">
   <p:cSld>
     <p:spTree>
@@ -5723,89 +5917,6 @@
 </p:sld>
 </file>
 
-<file path=ppt/slides/slide18.xml><?xml version="1.0" encoding="utf-8"?>
-<p:sld xmlns:a="http://schemas.openxmlformats.org/drawingml/2006/main" xmlns:r="http://schemas.openxmlformats.org/officeDocument/2006/relationships" xmlns:p="http://schemas.openxmlformats.org/presentationml/2006/main">
-  <p:cSld>
-    <p:spTree>
-      <p:nvGrpSpPr>
-        <p:cNvPr id="1" name=""/>
-        <p:cNvGrpSpPr/>
-        <p:nvPr/>
-      </p:nvGrpSpPr>
-      <p:grpSpPr>
-        <a:xfrm>
-          <a:off x="0" y="0"/>
-          <a:ext cx="0" cy="0"/>
-          <a:chOff x="0" y="0"/>
-          <a:chExt cx="0" cy="0"/>
-        </a:xfrm>
-      </p:grpSpPr>
-      <p:sp>
-        <p:nvSpPr>
-          <p:cNvPr id="2" name="Title 1">
-            <a:extLst>
-              <a:ext uri="{FF2B5EF4-FFF2-40B4-BE49-F238E27FC236}">
-                <a16:creationId xmlns:a16="http://schemas.microsoft.com/office/drawing/2014/main" id="{7FC1D40A-98BF-4CBE-A35A-F1D122BEA5E6}"/>
-              </a:ext>
-            </a:extLst>
-          </p:cNvPr>
-          <p:cNvSpPr>
-            <a:spLocks noGrp="1"/>
-          </p:cNvSpPr>
-          <p:nvPr>
-            <p:ph type="title"/>
-          </p:nvPr>
-        </p:nvSpPr>
-        <p:spPr/>
-        <p:txBody>
-          <a:bodyPr/>
-          <a:lstStyle/>
-          <a:p>
-            <a:r>
-              <a:rPr lang="en-US" dirty="0"/>
-              <a:t>Development...</a:t>
-            </a:r>
-          </a:p>
-        </p:txBody>
-      </p:sp>
-      <p:sp>
-        <p:nvSpPr>
-          <p:cNvPr id="3" name="Content Placeholder 2">
-            <a:extLst>
-              <a:ext uri="{FF2B5EF4-FFF2-40B4-BE49-F238E27FC236}">
-                <a16:creationId xmlns:a16="http://schemas.microsoft.com/office/drawing/2014/main" id="{2D523DCF-C694-46AC-B406-E58354147EA9}"/>
-              </a:ext>
-            </a:extLst>
-          </p:cNvPr>
-          <p:cNvSpPr>
-            <a:spLocks noGrp="1"/>
-          </p:cNvSpPr>
-          <p:nvPr>
-            <p:ph idx="1"/>
-          </p:nvPr>
-        </p:nvSpPr>
-        <p:spPr/>
-        <p:txBody>
-          <a:bodyPr/>
-          <a:lstStyle/>
-          <a:p>
-            <a:endParaRPr lang="en-US" dirty="0"/>
-          </a:p>
-        </p:txBody>
-      </p:sp>
-    </p:spTree>
-    <p:extLst>
-      <p:ext uri="{BB962C8B-B14F-4D97-AF65-F5344CB8AC3E}">
-        <p14:creationId xmlns:p14="http://schemas.microsoft.com/office/powerpoint/2010/main" val="3173424278"/>
-      </p:ext>
-    </p:extLst>
-  </p:cSld>
-  <p:clrMapOvr>
-    <a:masterClrMapping/>
-  </p:clrMapOvr>
-</p:sld>
-</file>
-
 <file path=ppt/slides/slide19.xml><?xml version="1.0" encoding="utf-8"?>
 <p:sld xmlns:a="http://schemas.openxmlformats.org/drawingml/2006/main" xmlns:r="http://schemas.openxmlformats.org/officeDocument/2006/relationships" xmlns:p="http://schemas.openxmlformats.org/presentationml/2006/main">
   <p:cSld>
@@ -5828,7 +5939,7 @@
           <p:cNvPr id="2" name="Title 1">
             <a:extLst>
               <a:ext uri="{FF2B5EF4-FFF2-40B4-BE49-F238E27FC236}">
-                <a16:creationId xmlns:a16="http://schemas.microsoft.com/office/drawing/2014/main" id="{7F7B68DA-473D-4B51-A38B-93A06DFF7DD5}"/>
+                <a16:creationId xmlns:a16="http://schemas.microsoft.com/office/drawing/2014/main" id="{7FC1D40A-98BF-4CBE-A35A-F1D122BEA5E6}"/>
               </a:ext>
             </a:extLst>
           </p:cNvPr>
@@ -5846,7 +5957,7 @@
           <a:p>
             <a:r>
               <a:rPr lang="en-US" dirty="0"/>
-              <a:t>Go Live!</a:t>
+              <a:t>Development...</a:t>
             </a:r>
           </a:p>
         </p:txBody>
@@ -5856,7 +5967,7 @@
           <p:cNvPr id="3" name="Content Placeholder 2">
             <a:extLst>
               <a:ext uri="{FF2B5EF4-FFF2-40B4-BE49-F238E27FC236}">
-                <a16:creationId xmlns:a16="http://schemas.microsoft.com/office/drawing/2014/main" id="{ACEB8B8B-6AA0-481C-A325-CA7EA058CF39}"/>
+                <a16:creationId xmlns:a16="http://schemas.microsoft.com/office/drawing/2014/main" id="{2D523DCF-C694-46AC-B406-E58354147EA9}"/>
               </a:ext>
             </a:extLst>
           </p:cNvPr>
@@ -5872,17 +5983,14 @@
           <a:bodyPr/>
           <a:lstStyle/>
           <a:p>
-            <a:r>
-              <a:rPr lang="en-US" dirty="0"/>
-              <a:t>&lt;link to URL&gt;</a:t>
-            </a:r>
+            <a:endParaRPr lang="en-US" dirty="0"/>
           </a:p>
         </p:txBody>
       </p:sp>
     </p:spTree>
     <p:extLst>
       <p:ext uri="{BB962C8B-B14F-4D97-AF65-F5344CB8AC3E}">
-        <p14:creationId xmlns:p14="http://schemas.microsoft.com/office/powerpoint/2010/main" val="3008425161"/>
+        <p14:creationId xmlns:p14="http://schemas.microsoft.com/office/powerpoint/2010/main" val="3173424278"/>
       </p:ext>
     </p:extLst>
   </p:cSld>
@@ -5956,7 +6064,7 @@
         <p:spPr/>
         <p:txBody>
           <a:bodyPr>
-            <a:normAutofit fontScale="92500" lnSpcReduction="20000"/>
+            <a:normAutofit fontScale="85000" lnSpcReduction="20000"/>
           </a:bodyPr>
           <a:lstStyle/>
           <a:p>
@@ -6035,6 +6143,13 @@
             <a:r>
               <a:rPr lang="en-US" dirty="0"/>
               <a:t>Wireframes</a:t>
+            </a:r>
+          </a:p>
+          <a:p>
+            <a:pPr lvl="1"/>
+            <a:r>
+              <a:rPr lang="en-US" dirty="0"/>
+              <a:t>Priority Content</a:t>
             </a:r>
           </a:p>
           <a:p>
@@ -6095,7 +6210,7 @@
           <p:cNvPr id="2" name="Title 1">
             <a:extLst>
               <a:ext uri="{FF2B5EF4-FFF2-40B4-BE49-F238E27FC236}">
-                <a16:creationId xmlns:a16="http://schemas.microsoft.com/office/drawing/2014/main" id="{10B8E23F-5094-466C-A3B1-1F64FD237EA5}"/>
+                <a16:creationId xmlns:a16="http://schemas.microsoft.com/office/drawing/2014/main" id="{7F7B68DA-473D-4B51-A38B-93A06DFF7DD5}"/>
               </a:ext>
             </a:extLst>
           </p:cNvPr>
@@ -6113,7 +6228,7 @@
           <a:p>
             <a:r>
               <a:rPr lang="en-US" dirty="0"/>
-              <a:t>Level of Effort and Takeaways</a:t>
+              <a:t>Go Live!</a:t>
             </a:r>
           </a:p>
         </p:txBody>
@@ -6123,7 +6238,7 @@
           <p:cNvPr id="3" name="Content Placeholder 2">
             <a:extLst>
               <a:ext uri="{FF2B5EF4-FFF2-40B4-BE49-F238E27FC236}">
-                <a16:creationId xmlns:a16="http://schemas.microsoft.com/office/drawing/2014/main" id="{00EB0048-9365-49CB-978F-C6FB3053D5D3}"/>
+                <a16:creationId xmlns:a16="http://schemas.microsoft.com/office/drawing/2014/main" id="{ACEB8B8B-6AA0-481C-A325-CA7EA058CF39}"/>
               </a:ext>
             </a:extLst>
           </p:cNvPr>
@@ -6136,32 +6251,12 @@
         </p:nvSpPr>
         <p:spPr/>
         <p:txBody>
-          <a:bodyPr>
-            <a:normAutofit/>
-          </a:bodyPr>
+          <a:bodyPr/>
           <a:lstStyle/>
           <a:p>
             <a:r>
               <a:rPr lang="en-US" dirty="0"/>
-              <a:t>A full featured Web App (admin, login, database, forms, Python/ML backend)</a:t>
-            </a:r>
-          </a:p>
-          <a:p>
-            <a:r>
-              <a:rPr lang="en-US" dirty="0"/>
-              <a:t>6-8 days deploy with learning curve</a:t>
-            </a:r>
-          </a:p>
-          <a:p>
-            <a:r>
-              <a:rPr lang="en-US" dirty="0"/>
-              <a:t>Less complicated than Tic-tac-toe, but my own work.</a:t>
-            </a:r>
-          </a:p>
-          <a:p>
-            <a:r>
-              <a:rPr lang="en-US" dirty="0"/>
-              <a:t>Wireframe and personas super important because...</a:t>
+              <a:t>&lt;link to URL&gt;</a:t>
             </a:r>
           </a:p>
         </p:txBody>
@@ -6169,7 +6264,7 @@
     </p:spTree>
     <p:extLst>
       <p:ext uri="{BB962C8B-B14F-4D97-AF65-F5344CB8AC3E}">
-        <p14:creationId xmlns:p14="http://schemas.microsoft.com/office/powerpoint/2010/main" val="3978747642"/>
+        <p14:creationId xmlns:p14="http://schemas.microsoft.com/office/powerpoint/2010/main" val="3008425161"/>
       </p:ext>
     </p:extLst>
   </p:cSld>
@@ -6219,6 +6314,112 @@
           <a:p>
             <a:r>
               <a:rPr lang="en-US" dirty="0"/>
+              <a:t>Level of Effort and Takeaways</a:t>
+            </a:r>
+          </a:p>
+        </p:txBody>
+      </p:sp>
+      <p:sp>
+        <p:nvSpPr>
+          <p:cNvPr id="3" name="Content Placeholder 2">
+            <a:extLst>
+              <a:ext uri="{FF2B5EF4-FFF2-40B4-BE49-F238E27FC236}">
+                <a16:creationId xmlns:a16="http://schemas.microsoft.com/office/drawing/2014/main" id="{00EB0048-9365-49CB-978F-C6FB3053D5D3}"/>
+              </a:ext>
+            </a:extLst>
+          </p:cNvPr>
+          <p:cNvSpPr>
+            <a:spLocks noGrp="1"/>
+          </p:cNvSpPr>
+          <p:nvPr>
+            <p:ph idx="1"/>
+          </p:nvPr>
+        </p:nvSpPr>
+        <p:spPr/>
+        <p:txBody>
+          <a:bodyPr>
+            <a:normAutofit/>
+          </a:bodyPr>
+          <a:lstStyle/>
+          <a:p>
+            <a:r>
+              <a:rPr lang="en-US" dirty="0"/>
+              <a:t>A full featured Web App (admin, login, database, forms, Python/ML backend)</a:t>
+            </a:r>
+          </a:p>
+          <a:p>
+            <a:r>
+              <a:rPr lang="en-US" dirty="0"/>
+              <a:t>6-8 days deploy with learning curve</a:t>
+            </a:r>
+          </a:p>
+          <a:p>
+            <a:r>
+              <a:rPr lang="en-US" dirty="0"/>
+              <a:t>Less complicated than Tic-tac-toe, but my own work.</a:t>
+            </a:r>
+          </a:p>
+          <a:p>
+            <a:r>
+              <a:rPr lang="en-US" dirty="0"/>
+              <a:t>Wireframe and personas super important because...</a:t>
+            </a:r>
+          </a:p>
+        </p:txBody>
+      </p:sp>
+    </p:spTree>
+    <p:extLst>
+      <p:ext uri="{BB962C8B-B14F-4D97-AF65-F5344CB8AC3E}">
+        <p14:creationId xmlns:p14="http://schemas.microsoft.com/office/powerpoint/2010/main" val="3978747642"/>
+      </p:ext>
+    </p:extLst>
+  </p:cSld>
+  <p:clrMapOvr>
+    <a:masterClrMapping/>
+  </p:clrMapOvr>
+</p:sld>
+</file>
+
+<file path=ppt/slides/slide22.xml><?xml version="1.0" encoding="utf-8"?>
+<p:sld xmlns:a="http://schemas.openxmlformats.org/drawingml/2006/main" xmlns:r="http://schemas.openxmlformats.org/officeDocument/2006/relationships" xmlns:p="http://schemas.openxmlformats.org/presentationml/2006/main">
+  <p:cSld>
+    <p:spTree>
+      <p:nvGrpSpPr>
+        <p:cNvPr id="1" name=""/>
+        <p:cNvGrpSpPr/>
+        <p:nvPr/>
+      </p:nvGrpSpPr>
+      <p:grpSpPr>
+        <a:xfrm>
+          <a:off x="0" y="0"/>
+          <a:ext cx="0" cy="0"/>
+          <a:chOff x="0" y="0"/>
+          <a:chExt cx="0" cy="0"/>
+        </a:xfrm>
+      </p:grpSpPr>
+      <p:sp>
+        <p:nvSpPr>
+          <p:cNvPr id="2" name="Title 1">
+            <a:extLst>
+              <a:ext uri="{FF2B5EF4-FFF2-40B4-BE49-F238E27FC236}">
+                <a16:creationId xmlns:a16="http://schemas.microsoft.com/office/drawing/2014/main" id="{10B8E23F-5094-466C-A3B1-1F64FD237EA5}"/>
+              </a:ext>
+            </a:extLst>
+          </p:cNvPr>
+          <p:cNvSpPr>
+            <a:spLocks noGrp="1"/>
+          </p:cNvSpPr>
+          <p:nvPr>
+            <p:ph type="title"/>
+          </p:nvPr>
+        </p:nvSpPr>
+        <p:spPr/>
+        <p:txBody>
+          <a:bodyPr/>
+          <a:lstStyle/>
+          <a:p>
+            <a:r>
+              <a:rPr lang="en-US" dirty="0"/>
               <a:t>References</a:t>
             </a:r>
           </a:p>
@@ -6476,7 +6677,7 @@
 </p:sld>
 </file>
 
-<file path=ppt/slides/slide22.xml><?xml version="1.0" encoding="utf-8"?>
+<file path=ppt/slides/slide23.xml><?xml version="1.0" encoding="utf-8"?>
 <p:sld xmlns:a="http://schemas.openxmlformats.org/drawingml/2006/main" xmlns:r="http://schemas.openxmlformats.org/officeDocument/2006/relationships" xmlns:p="http://schemas.openxmlformats.org/presentationml/2006/main">
   <p:cSld>
     <p:spTree>

</xml_diff>

<commit_message>
add all references/context - currently only shown on welcome page
</commit_message>
<xml_diff>
--- a/presentation.pptx
+++ b/presentation.pptx
@@ -282,7 +282,7 @@
           <a:p>
             <a:fld id="{90B9546A-7969-4B1B-92AE-0EBC43C27576}" type="datetimeFigureOut">
               <a:rPr lang="en-US" smtClean="0"/>
-              <a:t>4/24/2020</a:t>
+              <a:t>4/28/2020</a:t>
             </a:fld>
             <a:endParaRPr lang="en-US"/>
           </a:p>
@@ -480,7 +480,7 @@
           <a:p>
             <a:fld id="{90B9546A-7969-4B1B-92AE-0EBC43C27576}" type="datetimeFigureOut">
               <a:rPr lang="en-US" smtClean="0"/>
-              <a:t>4/24/2020</a:t>
+              <a:t>4/28/2020</a:t>
             </a:fld>
             <a:endParaRPr lang="en-US"/>
           </a:p>
@@ -688,7 +688,7 @@
           <a:p>
             <a:fld id="{90B9546A-7969-4B1B-92AE-0EBC43C27576}" type="datetimeFigureOut">
               <a:rPr lang="en-US" smtClean="0"/>
-              <a:t>4/24/2020</a:t>
+              <a:t>4/28/2020</a:t>
             </a:fld>
             <a:endParaRPr lang="en-US"/>
           </a:p>
@@ -886,7 +886,7 @@
           <a:p>
             <a:fld id="{90B9546A-7969-4B1B-92AE-0EBC43C27576}" type="datetimeFigureOut">
               <a:rPr lang="en-US" smtClean="0"/>
-              <a:t>4/24/2020</a:t>
+              <a:t>4/28/2020</a:t>
             </a:fld>
             <a:endParaRPr lang="en-US"/>
           </a:p>
@@ -1161,7 +1161,7 @@
           <a:p>
             <a:fld id="{90B9546A-7969-4B1B-92AE-0EBC43C27576}" type="datetimeFigureOut">
               <a:rPr lang="en-US" smtClean="0"/>
-              <a:t>4/24/2020</a:t>
+              <a:t>4/28/2020</a:t>
             </a:fld>
             <a:endParaRPr lang="en-US"/>
           </a:p>
@@ -1426,7 +1426,7 @@
           <a:p>
             <a:fld id="{90B9546A-7969-4B1B-92AE-0EBC43C27576}" type="datetimeFigureOut">
               <a:rPr lang="en-US" smtClean="0"/>
-              <a:t>4/24/2020</a:t>
+              <a:t>4/28/2020</a:t>
             </a:fld>
             <a:endParaRPr lang="en-US"/>
           </a:p>
@@ -1838,7 +1838,7 @@
           <a:p>
             <a:fld id="{90B9546A-7969-4B1B-92AE-0EBC43C27576}" type="datetimeFigureOut">
               <a:rPr lang="en-US" smtClean="0"/>
-              <a:t>4/24/2020</a:t>
+              <a:t>4/28/2020</a:t>
             </a:fld>
             <a:endParaRPr lang="en-US"/>
           </a:p>
@@ -1979,7 +1979,7 @@
           <a:p>
             <a:fld id="{90B9546A-7969-4B1B-92AE-0EBC43C27576}" type="datetimeFigureOut">
               <a:rPr lang="en-US" smtClean="0"/>
-              <a:t>4/24/2020</a:t>
+              <a:t>4/28/2020</a:t>
             </a:fld>
             <a:endParaRPr lang="en-US"/>
           </a:p>
@@ -2092,7 +2092,7 @@
           <a:p>
             <a:fld id="{90B9546A-7969-4B1B-92AE-0EBC43C27576}" type="datetimeFigureOut">
               <a:rPr lang="en-US" smtClean="0"/>
-              <a:t>4/24/2020</a:t>
+              <a:t>4/28/2020</a:t>
             </a:fld>
             <a:endParaRPr lang="en-US"/>
           </a:p>
@@ -2403,7 +2403,7 @@
           <a:p>
             <a:fld id="{90B9546A-7969-4B1B-92AE-0EBC43C27576}" type="datetimeFigureOut">
               <a:rPr lang="en-US" smtClean="0"/>
-              <a:t>4/24/2020</a:t>
+              <a:t>4/28/2020</a:t>
             </a:fld>
             <a:endParaRPr lang="en-US"/>
           </a:p>
@@ -2691,7 +2691,7 @@
           <a:p>
             <a:fld id="{90B9546A-7969-4B1B-92AE-0EBC43C27576}" type="datetimeFigureOut">
               <a:rPr lang="en-US" smtClean="0"/>
-              <a:t>4/24/2020</a:t>
+              <a:t>4/28/2020</a:t>
             </a:fld>
             <a:endParaRPr lang="en-US"/>
           </a:p>
@@ -2932,7 +2932,7 @@
           <a:p>
             <a:fld id="{90B9546A-7969-4B1B-92AE-0EBC43C27576}" type="datetimeFigureOut">
               <a:rPr lang="en-US" smtClean="0"/>
-              <a:t>4/24/2020</a:t>
+              <a:t>4/28/2020</a:t>
             </a:fld>
             <a:endParaRPr lang="en-US"/>
           </a:p>
@@ -10413,14 +10413,14 @@
           <a:p>
             <a:r>
               <a:rPr lang="en-US" dirty="0"/>
-              <a:t>What does that mean...</a:t>
+              <a:t>Django Web Application</a:t>
             </a:r>
             <a:br>
               <a:rPr lang="en-US" dirty="0"/>
             </a:br>
             <a:r>
               <a:rPr lang="en-US" sz="3200" dirty="0"/>
-              <a:t>Day 3</a:t>
+              <a:t>Today, Day2, Day 3</a:t>
             </a:r>
             <a:endParaRPr lang="en-US" dirty="0"/>
           </a:p>

</xml_diff>

<commit_message>
update presentatio nand add ref 04,06,09
</commit_message>
<xml_diff>
--- a/presentation.pptx
+++ b/presentation.pptx
@@ -24,11 +24,14 @@
     <p:sldId id="266" r:id="rId18"/>
     <p:sldId id="277" r:id="rId19"/>
     <p:sldId id="279" r:id="rId20"/>
-    <p:sldId id="282" r:id="rId21"/>
-    <p:sldId id="268" r:id="rId22"/>
-    <p:sldId id="274" r:id="rId23"/>
-    <p:sldId id="280" r:id="rId24"/>
-    <p:sldId id="267" r:id="rId25"/>
+    <p:sldId id="283" r:id="rId21"/>
+    <p:sldId id="285" r:id="rId22"/>
+    <p:sldId id="284" r:id="rId23"/>
+    <p:sldId id="282" r:id="rId24"/>
+    <p:sldId id="268" r:id="rId25"/>
+    <p:sldId id="274" r:id="rId26"/>
+    <p:sldId id="280" r:id="rId27"/>
+    <p:sldId id="267" r:id="rId28"/>
   </p:sldIdLst>
   <p:sldSz cx="12192000" cy="6858000"/>
   <p:notesSz cx="6858000" cy="9144000"/>
@@ -282,7 +285,7 @@
           <a:p>
             <a:fld id="{90B9546A-7969-4B1B-92AE-0EBC43C27576}" type="datetimeFigureOut">
               <a:rPr lang="en-US" smtClean="0"/>
-              <a:t>4/28/2020</a:t>
+              <a:t>5/1/2020</a:t>
             </a:fld>
             <a:endParaRPr lang="en-US"/>
           </a:p>
@@ -480,7 +483,7 @@
           <a:p>
             <a:fld id="{90B9546A-7969-4B1B-92AE-0EBC43C27576}" type="datetimeFigureOut">
               <a:rPr lang="en-US" smtClean="0"/>
-              <a:t>4/28/2020</a:t>
+              <a:t>5/1/2020</a:t>
             </a:fld>
             <a:endParaRPr lang="en-US"/>
           </a:p>
@@ -688,7 +691,7 @@
           <a:p>
             <a:fld id="{90B9546A-7969-4B1B-92AE-0EBC43C27576}" type="datetimeFigureOut">
               <a:rPr lang="en-US" smtClean="0"/>
-              <a:t>4/28/2020</a:t>
+              <a:t>5/1/2020</a:t>
             </a:fld>
             <a:endParaRPr lang="en-US"/>
           </a:p>
@@ -886,7 +889,7 @@
           <a:p>
             <a:fld id="{90B9546A-7969-4B1B-92AE-0EBC43C27576}" type="datetimeFigureOut">
               <a:rPr lang="en-US" smtClean="0"/>
-              <a:t>4/28/2020</a:t>
+              <a:t>5/1/2020</a:t>
             </a:fld>
             <a:endParaRPr lang="en-US"/>
           </a:p>
@@ -1161,7 +1164,7 @@
           <a:p>
             <a:fld id="{90B9546A-7969-4B1B-92AE-0EBC43C27576}" type="datetimeFigureOut">
               <a:rPr lang="en-US" smtClean="0"/>
-              <a:t>4/28/2020</a:t>
+              <a:t>5/1/2020</a:t>
             </a:fld>
             <a:endParaRPr lang="en-US"/>
           </a:p>
@@ -1426,7 +1429,7 @@
           <a:p>
             <a:fld id="{90B9546A-7969-4B1B-92AE-0EBC43C27576}" type="datetimeFigureOut">
               <a:rPr lang="en-US" smtClean="0"/>
-              <a:t>4/28/2020</a:t>
+              <a:t>5/1/2020</a:t>
             </a:fld>
             <a:endParaRPr lang="en-US"/>
           </a:p>
@@ -1838,7 +1841,7 @@
           <a:p>
             <a:fld id="{90B9546A-7969-4B1B-92AE-0EBC43C27576}" type="datetimeFigureOut">
               <a:rPr lang="en-US" smtClean="0"/>
-              <a:t>4/28/2020</a:t>
+              <a:t>5/1/2020</a:t>
             </a:fld>
             <a:endParaRPr lang="en-US"/>
           </a:p>
@@ -1979,7 +1982,7 @@
           <a:p>
             <a:fld id="{90B9546A-7969-4B1B-92AE-0EBC43C27576}" type="datetimeFigureOut">
               <a:rPr lang="en-US" smtClean="0"/>
-              <a:t>4/28/2020</a:t>
+              <a:t>5/1/2020</a:t>
             </a:fld>
             <a:endParaRPr lang="en-US"/>
           </a:p>
@@ -2092,7 +2095,7 @@
           <a:p>
             <a:fld id="{90B9546A-7969-4B1B-92AE-0EBC43C27576}" type="datetimeFigureOut">
               <a:rPr lang="en-US" smtClean="0"/>
-              <a:t>4/28/2020</a:t>
+              <a:t>5/1/2020</a:t>
             </a:fld>
             <a:endParaRPr lang="en-US"/>
           </a:p>
@@ -2403,7 +2406,7 @@
           <a:p>
             <a:fld id="{90B9546A-7969-4B1B-92AE-0EBC43C27576}" type="datetimeFigureOut">
               <a:rPr lang="en-US" smtClean="0"/>
-              <a:t>4/28/2020</a:t>
+              <a:t>5/1/2020</a:t>
             </a:fld>
             <a:endParaRPr lang="en-US"/>
           </a:p>
@@ -2691,7 +2694,7 @@
           <a:p>
             <a:fld id="{90B9546A-7969-4B1B-92AE-0EBC43C27576}" type="datetimeFigureOut">
               <a:rPr lang="en-US" smtClean="0"/>
-              <a:t>4/28/2020</a:t>
+              <a:t>5/1/2020</a:t>
             </a:fld>
             <a:endParaRPr lang="en-US"/>
           </a:p>
@@ -2932,7 +2935,7 @@
           <a:p>
             <a:fld id="{90B9546A-7969-4B1B-92AE-0EBC43C27576}" type="datetimeFigureOut">
               <a:rPr lang="en-US" smtClean="0"/>
-              <a:t>4/28/2020</a:t>
+              <a:t>5/1/2020</a:t>
             </a:fld>
             <a:endParaRPr lang="en-US"/>
           </a:p>
@@ -6116,13 +6119,25 @@
             </a:pPr>
             <a:r>
               <a:rPr lang="en-US" sz="3500" dirty="0"/>
-              <a:t>This time:</a:t>
-            </a:r>
-          </a:p>
-          <a:p>
-            <a:r>
-              <a:rPr lang="en-US" dirty="0"/>
-              <a:t>“Star Chaser” Web Application</a:t>
+              <a:t>This time: </a:t>
+            </a:r>
+            <a:r>
+              <a:rPr lang="en-US" dirty="0"/>
+              <a:t>“</a:t>
+            </a:r>
+            <a:r>
+              <a:rPr lang="en-US" dirty="0" err="1"/>
+              <a:t>StarChaser</a:t>
+            </a:r>
+            <a:r>
+              <a:rPr lang="en-US" dirty="0"/>
+              <a:t>” Web Application</a:t>
+            </a:r>
+          </a:p>
+          <a:p>
+            <a:r>
+              <a:rPr lang="en-US" dirty="0"/>
+              <a:t> Planning</a:t>
             </a:r>
           </a:p>
           <a:p>
@@ -6170,15 +6185,7 @@
           <a:p>
             <a:r>
               <a:rPr lang="en-US" dirty="0"/>
-              <a:t>&lt;stretch:  front-end </a:t>
-            </a:r>
-            <a:r>
-              <a:rPr lang="en-US" dirty="0" err="1"/>
-              <a:t>Javascript</a:t>
-            </a:r>
-            <a:r>
-              <a:rPr lang="en-US" dirty="0"/>
-              <a:t> for charting&gt;</a:t>
+              <a:t>Data Visualization (Google Charts)</a:t>
             </a:r>
           </a:p>
         </p:txBody>
@@ -6197,6 +6204,489 @@
 </file>
 
 <file path=ppt/slides/slide20.xml><?xml version="1.0" encoding="utf-8"?>
+<p:sld xmlns:a="http://schemas.openxmlformats.org/drawingml/2006/main" xmlns:r="http://schemas.openxmlformats.org/officeDocument/2006/relationships" xmlns:p="http://schemas.openxmlformats.org/presentationml/2006/main">
+  <p:cSld>
+    <p:spTree>
+      <p:nvGrpSpPr>
+        <p:cNvPr id="1" name=""/>
+        <p:cNvGrpSpPr/>
+        <p:nvPr/>
+      </p:nvGrpSpPr>
+      <p:grpSpPr>
+        <a:xfrm>
+          <a:off x="0" y="0"/>
+          <a:ext cx="0" cy="0"/>
+          <a:chOff x="0" y="0"/>
+          <a:chExt cx="0" cy="0"/>
+        </a:xfrm>
+      </p:grpSpPr>
+      <p:sp>
+        <p:nvSpPr>
+          <p:cNvPr id="2" name="Title 1">
+            <a:extLst>
+              <a:ext uri="{FF2B5EF4-FFF2-40B4-BE49-F238E27FC236}">
+                <a16:creationId xmlns:a16="http://schemas.microsoft.com/office/drawing/2014/main" id="{504B7C1F-E423-4587-AD63-A889BAE3F03F}"/>
+              </a:ext>
+            </a:extLst>
+          </p:cNvPr>
+          <p:cNvSpPr>
+            <a:spLocks noGrp="1"/>
+          </p:cNvSpPr>
+          <p:nvPr>
+            <p:ph type="title"/>
+          </p:nvPr>
+        </p:nvSpPr>
+        <p:spPr/>
+        <p:txBody>
+          <a:bodyPr/>
+          <a:lstStyle/>
+          <a:p>
+            <a:r>
+              <a:rPr lang="en-US" dirty="0"/>
+              <a:t>Data Visualization</a:t>
+            </a:r>
+          </a:p>
+        </p:txBody>
+      </p:sp>
+      <p:sp>
+        <p:nvSpPr>
+          <p:cNvPr id="3" name="Content Placeholder 2">
+            <a:extLst>
+              <a:ext uri="{FF2B5EF4-FFF2-40B4-BE49-F238E27FC236}">
+                <a16:creationId xmlns:a16="http://schemas.microsoft.com/office/drawing/2014/main" id="{069B53B7-D426-49E6-942F-CD87BB641717}"/>
+              </a:ext>
+            </a:extLst>
+          </p:cNvPr>
+          <p:cNvSpPr>
+            <a:spLocks noGrp="1"/>
+          </p:cNvSpPr>
+          <p:nvPr>
+            <p:ph idx="1"/>
+          </p:nvPr>
+        </p:nvSpPr>
+        <p:spPr>
+          <a:xfrm>
+            <a:off x="576942" y="1690688"/>
+            <a:ext cx="10515599" cy="595312"/>
+          </a:xfrm>
+        </p:spPr>
+        <p:txBody>
+          <a:bodyPr>
+            <a:normAutofit/>
+          </a:bodyPr>
+          <a:lstStyle/>
+          <a:p>
+            <a:r>
+              <a:rPr lang="en-US" dirty="0"/>
+              <a:t>Tons of libraries.  High end (D3.js) to basic (Google Charts)</a:t>
+            </a:r>
+          </a:p>
+          <a:p>
+            <a:pPr marL="0" indent="0">
+              <a:buNone/>
+            </a:pPr>
+            <a:endParaRPr lang="en-US" dirty="0"/>
+          </a:p>
+        </p:txBody>
+      </p:sp>
+      <p:pic>
+        <p:nvPicPr>
+          <p:cNvPr id="4" name="Picture 3">
+            <a:extLst>
+              <a:ext uri="{FF2B5EF4-FFF2-40B4-BE49-F238E27FC236}">
+                <a16:creationId xmlns:a16="http://schemas.microsoft.com/office/drawing/2014/main" id="{C3B25813-2046-484F-85F0-BAAD76DDEB7E}"/>
+              </a:ext>
+            </a:extLst>
+          </p:cNvPr>
+          <p:cNvPicPr>
+            <a:picLocks noChangeAspect="1"/>
+          </p:cNvPicPr>
+          <p:nvPr/>
+        </p:nvPicPr>
+        <p:blipFill>
+          <a:blip r:embed="rId2"/>
+          <a:stretch>
+            <a:fillRect/>
+          </a:stretch>
+        </p:blipFill>
+        <p:spPr>
+          <a:xfrm>
+            <a:off x="4182943" y="2286000"/>
+            <a:ext cx="7170857" cy="3462240"/>
+          </a:xfrm>
+          <a:prstGeom prst="rect">
+            <a:avLst/>
+          </a:prstGeom>
+        </p:spPr>
+      </p:pic>
+      <p:sp>
+        <p:nvSpPr>
+          <p:cNvPr id="5" name="Rectangle 4">
+            <a:extLst>
+              <a:ext uri="{FF2B5EF4-FFF2-40B4-BE49-F238E27FC236}">
+                <a16:creationId xmlns:a16="http://schemas.microsoft.com/office/drawing/2014/main" id="{563B469A-08EF-4462-B54E-6D512F0937C6}"/>
+              </a:ext>
+            </a:extLst>
+          </p:cNvPr>
+          <p:cNvSpPr/>
+          <p:nvPr/>
+        </p:nvSpPr>
+        <p:spPr>
+          <a:xfrm>
+            <a:off x="753943" y="5938877"/>
+            <a:ext cx="10338598" cy="553998"/>
+          </a:xfrm>
+          <a:prstGeom prst="rect">
+            <a:avLst/>
+          </a:prstGeom>
+        </p:spPr>
+        <p:txBody>
+          <a:bodyPr wrap="square">
+            <a:spAutoFit/>
+          </a:bodyPr>
+          <a:lstStyle/>
+          <a:p>
+            <a:r>
+              <a:rPr lang="en-US" sz="1000" dirty="0"/>
+              <a:t>References:</a:t>
+            </a:r>
+          </a:p>
+          <a:p>
+            <a:pPr lvl="1"/>
+            <a:r>
+              <a:rPr lang="en-US" sz="1000" dirty="0">
+                <a:hlinkClick r:id="rId3"/>
+              </a:rPr>
+              <a:t>https://app.pluralsight.com/library/courses/build-first-data-visualization-google-charts</a:t>
+            </a:r>
+            <a:endParaRPr lang="en-US" sz="1000" dirty="0"/>
+          </a:p>
+          <a:p>
+            <a:pPr lvl="1"/>
+            <a:r>
+              <a:rPr lang="en-US" sz="1000" dirty="0">
+                <a:hlinkClick r:id="rId4"/>
+              </a:rPr>
+              <a:t>https://www.sitepoint.com/best-javascript-charting-libraries/</a:t>
+            </a:r>
+            <a:endParaRPr lang="en-US" sz="1000" dirty="0"/>
+          </a:p>
+        </p:txBody>
+      </p:sp>
+      <p:sp>
+        <p:nvSpPr>
+          <p:cNvPr id="6" name="Rectangle 5">
+            <a:extLst>
+              <a:ext uri="{FF2B5EF4-FFF2-40B4-BE49-F238E27FC236}">
+                <a16:creationId xmlns:a16="http://schemas.microsoft.com/office/drawing/2014/main" id="{86D4800D-C305-4570-B941-6DE0E4573E1F}"/>
+              </a:ext>
+            </a:extLst>
+          </p:cNvPr>
+          <p:cNvSpPr/>
+          <p:nvPr/>
+        </p:nvSpPr>
+        <p:spPr>
+          <a:xfrm>
+            <a:off x="576942" y="2496146"/>
+            <a:ext cx="3136642" cy="1938992"/>
+          </a:xfrm>
+          <a:prstGeom prst="rect">
+            <a:avLst/>
+          </a:prstGeom>
+        </p:spPr>
+        <p:txBody>
+          <a:bodyPr wrap="square">
+            <a:spAutoFit/>
+          </a:bodyPr>
+          <a:lstStyle/>
+          <a:p>
+            <a:pPr marL="285750" indent="-285750">
+              <a:buFont typeface="Arial" panose="020B0604020202020204" pitchFamily="34" charset="0"/>
+              <a:buChar char="•"/>
+            </a:pPr>
+            <a:r>
+              <a:rPr lang="en-US" sz="2000" dirty="0"/>
+              <a:t>Initial exploration is by Jupyter Notebook and/or Pandas/</a:t>
+            </a:r>
+            <a:r>
+              <a:rPr lang="en-US" sz="2000" dirty="0" err="1"/>
+              <a:t>MatplotLib</a:t>
+            </a:r>
+            <a:r>
+              <a:rPr lang="en-US" sz="2000" dirty="0"/>
+              <a:t>... see Titanic and </a:t>
+            </a:r>
+            <a:r>
+              <a:rPr lang="en-US" sz="2000" dirty="0" err="1"/>
+              <a:t>PLAsTiCC</a:t>
+            </a:r>
+            <a:r>
+              <a:rPr lang="en-US" sz="2000" dirty="0"/>
+              <a:t> #1</a:t>
+            </a:r>
+          </a:p>
+          <a:p>
+            <a:pPr marL="285750" indent="-285750">
+              <a:buFont typeface="Arial" panose="020B0604020202020204" pitchFamily="34" charset="0"/>
+              <a:buChar char="•"/>
+            </a:pPr>
+            <a:r>
+              <a:rPr lang="en-US" sz="2000" dirty="0"/>
+              <a:t>For Web App I went with Google Charts</a:t>
+            </a:r>
+          </a:p>
+        </p:txBody>
+      </p:sp>
+    </p:spTree>
+    <p:extLst>
+      <p:ext uri="{BB962C8B-B14F-4D97-AF65-F5344CB8AC3E}">
+        <p14:creationId xmlns:p14="http://schemas.microsoft.com/office/powerpoint/2010/main" val="3004834643"/>
+      </p:ext>
+    </p:extLst>
+  </p:cSld>
+  <p:clrMapOvr>
+    <a:masterClrMapping/>
+  </p:clrMapOvr>
+</p:sld>
+</file>
+
+<file path=ppt/slides/slide21.xml><?xml version="1.0" encoding="utf-8"?>
+<p:sld xmlns:a="http://schemas.openxmlformats.org/drawingml/2006/main" xmlns:r="http://schemas.openxmlformats.org/officeDocument/2006/relationships" xmlns:p="http://schemas.openxmlformats.org/presentationml/2006/main">
+  <p:cSld>
+    <p:spTree>
+      <p:nvGrpSpPr>
+        <p:cNvPr id="1" name=""/>
+        <p:cNvGrpSpPr/>
+        <p:nvPr/>
+      </p:nvGrpSpPr>
+      <p:grpSpPr>
+        <a:xfrm>
+          <a:off x="0" y="0"/>
+          <a:ext cx="0" cy="0"/>
+          <a:chOff x="0" y="0"/>
+          <a:chExt cx="0" cy="0"/>
+        </a:xfrm>
+      </p:grpSpPr>
+      <p:sp>
+        <p:nvSpPr>
+          <p:cNvPr id="2" name="Title 1">
+            <a:extLst>
+              <a:ext uri="{FF2B5EF4-FFF2-40B4-BE49-F238E27FC236}">
+                <a16:creationId xmlns:a16="http://schemas.microsoft.com/office/drawing/2014/main" id="{DC6CAB97-7247-440A-8842-E575D7625847}"/>
+              </a:ext>
+            </a:extLst>
+          </p:cNvPr>
+          <p:cNvSpPr>
+            <a:spLocks noGrp="1"/>
+          </p:cNvSpPr>
+          <p:nvPr>
+            <p:ph type="title"/>
+          </p:nvPr>
+        </p:nvSpPr>
+        <p:spPr/>
+        <p:txBody>
+          <a:bodyPr/>
+          <a:lstStyle/>
+          <a:p>
+            <a:r>
+              <a:rPr lang="en-US" dirty="0"/>
+              <a:t>Visualization</a:t>
+            </a:r>
+          </a:p>
+        </p:txBody>
+      </p:sp>
+      <p:pic>
+        <p:nvPicPr>
+          <p:cNvPr id="4" name="Picture 3">
+            <a:extLst>
+              <a:ext uri="{FF2B5EF4-FFF2-40B4-BE49-F238E27FC236}">
+                <a16:creationId xmlns:a16="http://schemas.microsoft.com/office/drawing/2014/main" id="{91BBDDC0-06F1-478A-A695-DEF55B098A7B}"/>
+              </a:ext>
+            </a:extLst>
+          </p:cNvPr>
+          <p:cNvPicPr>
+            <a:picLocks noChangeAspect="1"/>
+          </p:cNvPicPr>
+          <p:nvPr/>
+        </p:nvPicPr>
+        <p:blipFill>
+          <a:blip r:embed="rId2"/>
+          <a:stretch>
+            <a:fillRect/>
+          </a:stretch>
+        </p:blipFill>
+        <p:spPr>
+          <a:xfrm>
+            <a:off x="729342" y="1368098"/>
+            <a:ext cx="10122159" cy="4842322"/>
+          </a:xfrm>
+          <a:prstGeom prst="rect">
+            <a:avLst/>
+          </a:prstGeom>
+        </p:spPr>
+      </p:pic>
+      <p:sp>
+        <p:nvSpPr>
+          <p:cNvPr id="5" name="Rectangle 4">
+            <a:extLst>
+              <a:ext uri="{FF2B5EF4-FFF2-40B4-BE49-F238E27FC236}">
+                <a16:creationId xmlns:a16="http://schemas.microsoft.com/office/drawing/2014/main" id="{A5CAF724-1FD4-4D61-9153-0D915CEB5789}"/>
+              </a:ext>
+            </a:extLst>
+          </p:cNvPr>
+          <p:cNvSpPr/>
+          <p:nvPr/>
+        </p:nvSpPr>
+        <p:spPr>
+          <a:xfrm>
+            <a:off x="519404" y="6200487"/>
+            <a:ext cx="8305800" cy="400110"/>
+          </a:xfrm>
+          <a:prstGeom prst="rect">
+            <a:avLst/>
+          </a:prstGeom>
+        </p:spPr>
+        <p:txBody>
+          <a:bodyPr wrap="square">
+            <a:spAutoFit/>
+          </a:bodyPr>
+          <a:lstStyle/>
+          <a:p>
+            <a:r>
+              <a:rPr lang="en-US" sz="1000" dirty="0"/>
+              <a:t>Reference:</a:t>
+            </a:r>
+          </a:p>
+          <a:p>
+            <a:pPr lvl="1"/>
+            <a:r>
+              <a:rPr lang="en-US" sz="1000" dirty="0">
+                <a:hlinkClick r:id="rId3"/>
+              </a:rPr>
+              <a:t>https://app.pluralsight.com/library/courses/build-first-data-visualization-google-charts</a:t>
+            </a:r>
+            <a:endParaRPr lang="en-US" sz="1000" dirty="0"/>
+          </a:p>
+        </p:txBody>
+      </p:sp>
+    </p:spTree>
+    <p:extLst>
+      <p:ext uri="{BB962C8B-B14F-4D97-AF65-F5344CB8AC3E}">
+        <p14:creationId xmlns:p14="http://schemas.microsoft.com/office/powerpoint/2010/main" val="1735886717"/>
+      </p:ext>
+    </p:extLst>
+  </p:cSld>
+  <p:clrMapOvr>
+    <a:masterClrMapping/>
+  </p:clrMapOvr>
+</p:sld>
+</file>
+
+<file path=ppt/slides/slide22.xml><?xml version="1.0" encoding="utf-8"?>
+<p:sld xmlns:a="http://schemas.openxmlformats.org/drawingml/2006/main" xmlns:r="http://schemas.openxmlformats.org/officeDocument/2006/relationships" xmlns:p="http://schemas.openxmlformats.org/presentationml/2006/main">
+  <p:cSld>
+    <p:spTree>
+      <p:nvGrpSpPr>
+        <p:cNvPr id="1" name=""/>
+        <p:cNvGrpSpPr/>
+        <p:nvPr/>
+      </p:nvGrpSpPr>
+      <p:grpSpPr>
+        <a:xfrm>
+          <a:off x="0" y="0"/>
+          <a:ext cx="0" cy="0"/>
+          <a:chOff x="0" y="0"/>
+          <a:chExt cx="0" cy="0"/>
+        </a:xfrm>
+      </p:grpSpPr>
+      <p:sp>
+        <p:nvSpPr>
+          <p:cNvPr id="5" name="Rectangle 4">
+            <a:extLst>
+              <a:ext uri="{FF2B5EF4-FFF2-40B4-BE49-F238E27FC236}">
+                <a16:creationId xmlns:a16="http://schemas.microsoft.com/office/drawing/2014/main" id="{563B469A-08EF-4462-B54E-6D512F0937C6}"/>
+              </a:ext>
+            </a:extLst>
+          </p:cNvPr>
+          <p:cNvSpPr/>
+          <p:nvPr/>
+        </p:nvSpPr>
+        <p:spPr>
+          <a:xfrm>
+            <a:off x="558068" y="6200623"/>
+            <a:ext cx="10338598" cy="400110"/>
+          </a:xfrm>
+          <a:prstGeom prst="rect">
+            <a:avLst/>
+          </a:prstGeom>
+        </p:spPr>
+        <p:txBody>
+          <a:bodyPr wrap="square">
+            <a:spAutoFit/>
+          </a:bodyPr>
+          <a:lstStyle/>
+          <a:p>
+            <a:r>
+              <a:rPr lang="en-US" sz="1000" dirty="0"/>
+              <a:t>Reference:</a:t>
+            </a:r>
+          </a:p>
+          <a:p>
+            <a:pPr lvl="1"/>
+            <a:r>
+              <a:rPr lang="en-US" sz="1000" dirty="0">
+                <a:hlinkClick r:id="rId2"/>
+              </a:rPr>
+              <a:t>https://app.pluralsight.com/library/courses/build-first-data-visualization-google-charts</a:t>
+            </a:r>
+            <a:endParaRPr lang="en-US" sz="1000" dirty="0"/>
+          </a:p>
+        </p:txBody>
+      </p:sp>
+      <p:pic>
+        <p:nvPicPr>
+          <p:cNvPr id="9" name="Picture 8">
+            <a:extLst>
+              <a:ext uri="{FF2B5EF4-FFF2-40B4-BE49-F238E27FC236}">
+                <a16:creationId xmlns:a16="http://schemas.microsoft.com/office/drawing/2014/main" id="{21A6DBDE-E35C-4653-9AA3-7DE97C00B0F1}"/>
+              </a:ext>
+            </a:extLst>
+          </p:cNvPr>
+          <p:cNvPicPr>
+            <a:picLocks noChangeAspect="1"/>
+          </p:cNvPicPr>
+          <p:nvPr/>
+        </p:nvPicPr>
+        <p:blipFill>
+          <a:blip r:embed="rId3"/>
+          <a:stretch>
+            <a:fillRect/>
+          </a:stretch>
+        </p:blipFill>
+        <p:spPr>
+          <a:xfrm>
+            <a:off x="1890858" y="257267"/>
+            <a:ext cx="8139550" cy="6075751"/>
+          </a:xfrm>
+          <a:prstGeom prst="rect">
+            <a:avLst/>
+          </a:prstGeom>
+        </p:spPr>
+      </p:pic>
+    </p:spTree>
+    <p:extLst>
+      <p:ext uri="{BB962C8B-B14F-4D97-AF65-F5344CB8AC3E}">
+        <p14:creationId xmlns:p14="http://schemas.microsoft.com/office/powerpoint/2010/main" val="3893797724"/>
+      </p:ext>
+    </p:extLst>
+  </p:cSld>
+  <p:clrMapOvr>
+    <a:masterClrMapping/>
+  </p:clrMapOvr>
+</p:sld>
+</file>
+
+<file path=ppt/slides/slide23.xml><?xml version="1.0" encoding="utf-8"?>
 <p:sld xmlns:a="http://schemas.openxmlformats.org/drawingml/2006/main" xmlns:r="http://schemas.openxmlformats.org/officeDocument/2006/relationships" xmlns:p="http://schemas.openxmlformats.org/presentationml/2006/main">
   <p:cSld>
     <p:spTree>
@@ -6354,7 +6844,7 @@
 </p:sld>
 </file>
 
-<file path=ppt/slides/slide21.xml><?xml version="1.0" encoding="utf-8"?>
+<file path=ppt/slides/slide24.xml><?xml version="1.0" encoding="utf-8"?>
 <p:sld xmlns:a="http://schemas.openxmlformats.org/drawingml/2006/main" xmlns:r="http://schemas.openxmlformats.org/officeDocument/2006/relationships" xmlns:p="http://schemas.openxmlformats.org/presentationml/2006/main">
   <p:cSld>
     <p:spTree>
@@ -6440,7 +6930,7 @@
 </p:sld>
 </file>
 
-<file path=ppt/slides/slide22.xml><?xml version="1.0" encoding="utf-8"?>
+<file path=ppt/slides/slide25.xml><?xml version="1.0" encoding="utf-8"?>
 <p:sld xmlns:a="http://schemas.openxmlformats.org/drawingml/2006/main" xmlns:r="http://schemas.openxmlformats.org/officeDocument/2006/relationships" xmlns:p="http://schemas.openxmlformats.org/presentationml/2006/main">
   <p:cSld>
     <p:spTree>
@@ -6546,7 +7036,7 @@
 </p:sld>
 </file>
 
-<file path=ppt/slides/slide23.xml><?xml version="1.0" encoding="utf-8"?>
+<file path=ppt/slides/slide26.xml><?xml version="1.0" encoding="utf-8"?>
 <p:sld xmlns:a="http://schemas.openxmlformats.org/drawingml/2006/main" xmlns:r="http://schemas.openxmlformats.org/officeDocument/2006/relationships" xmlns:p="http://schemas.openxmlformats.org/presentationml/2006/main">
   <p:cSld>
     <p:spTree>
@@ -6843,7 +7333,7 @@
 </p:sld>
 </file>
 
-<file path=ppt/slides/slide24.xml><?xml version="1.0" encoding="utf-8"?>
+<file path=ppt/slides/slide27.xml><?xml version="1.0" encoding="utf-8"?>
 <p:sld xmlns:a="http://schemas.openxmlformats.org/drawingml/2006/main" xmlns:r="http://schemas.openxmlformats.org/officeDocument/2006/relationships" xmlns:p="http://schemas.openxmlformats.org/presentationml/2006/main">
   <p:cSld>
     <p:spTree>

</xml_diff>